<commit_message>
added deepromoter setup files.
</commit_message>
<xml_diff>
--- a/Sequence Processing.pptx
+++ b/Sequence Processing.pptx
@@ -7,28 +7,30 @@
   <p:sldIdLst>
     <p:sldId id="256" r:id="rId2"/>
     <p:sldId id="279" r:id="rId3"/>
-    <p:sldId id="280" r:id="rId4"/>
-    <p:sldId id="281" r:id="rId5"/>
-    <p:sldId id="268" r:id="rId6"/>
-    <p:sldId id="272" r:id="rId7"/>
-    <p:sldId id="271" r:id="rId8"/>
-    <p:sldId id="276" r:id="rId9"/>
-    <p:sldId id="270" r:id="rId10"/>
-    <p:sldId id="269" r:id="rId11"/>
-    <p:sldId id="273" r:id="rId12"/>
-    <p:sldId id="278" r:id="rId13"/>
-    <p:sldId id="274" r:id="rId14"/>
-    <p:sldId id="277" r:id="rId15"/>
-    <p:sldId id="262" r:id="rId16"/>
-    <p:sldId id="263" r:id="rId17"/>
-    <p:sldId id="264" r:id="rId18"/>
-    <p:sldId id="265" r:id="rId19"/>
-    <p:sldId id="266" r:id="rId20"/>
-    <p:sldId id="261" r:id="rId21"/>
-    <p:sldId id="258" r:id="rId22"/>
-    <p:sldId id="260" r:id="rId23"/>
-    <p:sldId id="259" r:id="rId24"/>
-    <p:sldId id="275" r:id="rId25"/>
+    <p:sldId id="283" r:id="rId4"/>
+    <p:sldId id="280" r:id="rId5"/>
+    <p:sldId id="282" r:id="rId6"/>
+    <p:sldId id="281" r:id="rId7"/>
+    <p:sldId id="268" r:id="rId8"/>
+    <p:sldId id="272" r:id="rId9"/>
+    <p:sldId id="271" r:id="rId10"/>
+    <p:sldId id="276" r:id="rId11"/>
+    <p:sldId id="270" r:id="rId12"/>
+    <p:sldId id="269" r:id="rId13"/>
+    <p:sldId id="273" r:id="rId14"/>
+    <p:sldId id="278" r:id="rId15"/>
+    <p:sldId id="274" r:id="rId16"/>
+    <p:sldId id="277" r:id="rId17"/>
+    <p:sldId id="262" r:id="rId18"/>
+    <p:sldId id="263" r:id="rId19"/>
+    <p:sldId id="264" r:id="rId20"/>
+    <p:sldId id="265" r:id="rId21"/>
+    <p:sldId id="266" r:id="rId22"/>
+    <p:sldId id="261" r:id="rId23"/>
+    <p:sldId id="258" r:id="rId24"/>
+    <p:sldId id="260" r:id="rId25"/>
+    <p:sldId id="259" r:id="rId26"/>
+    <p:sldId id="275" r:id="rId27"/>
   </p:sldIdLst>
   <p:sldSz cx="12192000" cy="6858000"/>
   <p:notesSz cx="6858000" cy="9144000"/>
@@ -148,6 +150,509 @@
 </file>
 
 <file path=ppt/charts/chart1.xml><?xml version="1.0" encoding="utf-8"?>
+<c:chartSpace xmlns:c="http://schemas.openxmlformats.org/drawingml/2006/chart" xmlns:a="http://schemas.openxmlformats.org/drawingml/2006/main" xmlns:r="http://schemas.openxmlformats.org/officeDocument/2006/relationships" xmlns:c16r2="http://schemas.microsoft.com/office/drawing/2015/06/chart">
+  <c:date1904 val="0"/>
+  <c:lang val="en-US"/>
+  <c:roundedCorners val="0"/>
+  <mc:AlternateContent xmlns:mc="http://schemas.openxmlformats.org/markup-compatibility/2006">
+    <mc:Choice xmlns:c14="http://schemas.microsoft.com/office/drawing/2007/8/2/chart" Requires="c14">
+      <c14:style val="102"/>
+    </mc:Choice>
+    <mc:Fallback>
+      <c:style val="2"/>
+    </mc:Fallback>
+  </mc:AlternateContent>
+  <c:chart>
+    <c:title>
+      <c:tx>
+        <c:rich>
+          <a:bodyPr rot="0" spcFirstLastPara="1" vertOverflow="ellipsis" vert="horz" wrap="square" anchor="ctr" anchorCtr="1"/>
+          <a:lstStyle/>
+          <a:p>
+            <a:pPr>
+              <a:defRPr sz="1400" b="0" i="0" u="none" strike="noStrike" kern="1200" spc="0" baseline="0">
+                <a:solidFill>
+                  <a:schemeClr val="tx1">
+                    <a:lumMod val="65000"/>
+                    <a:lumOff val="35000"/>
+                  </a:schemeClr>
+                </a:solidFill>
+                <a:latin typeface="+mn-lt"/>
+                <a:ea typeface="+mn-ea"/>
+                <a:cs typeface="+mn-cs"/>
+              </a:defRPr>
+            </a:pPr>
+            <a:r>
+              <a:rPr lang="en-ID"/>
+              <a:t>Performa Akurasi Model TATA &amp; Non TATA pada</a:t>
+            </a:r>
+            <a:r>
+              <a:rPr lang="en-ID" baseline="0"/>
+              <a:t> Dataset Manusia dan Macaca</a:t>
+            </a:r>
+            <a:endParaRPr lang="en-ID"/>
+          </a:p>
+        </c:rich>
+      </c:tx>
+      <c:overlay val="0"/>
+      <c:spPr>
+        <a:noFill/>
+        <a:ln>
+          <a:noFill/>
+        </a:ln>
+        <a:effectLst/>
+      </c:spPr>
+      <c:txPr>
+        <a:bodyPr rot="0" spcFirstLastPara="1" vertOverflow="ellipsis" vert="horz" wrap="square" anchor="ctr" anchorCtr="1"/>
+        <a:lstStyle/>
+        <a:p>
+          <a:pPr>
+            <a:defRPr sz="1400" b="0" i="0" u="none" strike="noStrike" kern="1200" spc="0" baseline="0">
+              <a:solidFill>
+                <a:schemeClr val="tx1">
+                  <a:lumMod val="65000"/>
+                  <a:lumOff val="35000"/>
+                </a:schemeClr>
+              </a:solidFill>
+              <a:latin typeface="+mn-lt"/>
+              <a:ea typeface="+mn-ea"/>
+              <a:cs typeface="+mn-cs"/>
+            </a:defRPr>
+          </a:pPr>
+          <a:endParaRPr lang="en-US"/>
+        </a:p>
+      </c:txPr>
+    </c:title>
+    <c:autoTitleDeleted val="0"/>
+    <c:plotArea>
+      <c:layout/>
+      <c:barChart>
+        <c:barDir val="col"/>
+        <c:grouping val="clustered"/>
+        <c:varyColors val="0"/>
+        <c:ser>
+          <c:idx val="0"/>
+          <c:order val="0"/>
+          <c:tx>
+            <c:strRef>
+              <c:f>Sheet2!$B$3</c:f>
+              <c:strCache>
+                <c:ptCount val="1"/>
+                <c:pt idx="0">
+                  <c:v>human_tata_positive</c:v>
+                </c:pt>
+              </c:strCache>
+            </c:strRef>
+          </c:tx>
+          <c:spPr>
+            <a:solidFill>
+              <a:schemeClr val="accent1"/>
+            </a:solidFill>
+            <a:ln>
+              <a:noFill/>
+            </a:ln>
+            <a:effectLst/>
+          </c:spPr>
+          <c:invertIfNegative val="0"/>
+          <c:cat>
+            <c:strRef>
+              <c:f>Sheet2!$C$2:$D$2</c:f>
+              <c:strCache>
+                <c:ptCount val="2"/>
+                <c:pt idx="0">
+                  <c:v>TATA Prediction</c:v>
+                </c:pt>
+                <c:pt idx="1">
+                  <c:v>Non TATA Prediction</c:v>
+                </c:pt>
+              </c:strCache>
+            </c:strRef>
+          </c:cat>
+          <c:val>
+            <c:numRef>
+              <c:f>Sheet2!$C$3:$D$3</c:f>
+              <c:numCache>
+                <c:formatCode>0%</c:formatCode>
+                <c:ptCount val="2"/>
+                <c:pt idx="0" formatCode="0.00%">
+                  <c:v>0.52600000000000002</c:v>
+                </c:pt>
+                <c:pt idx="1">
+                  <c:v>0.14000000000000001</c:v>
+                </c:pt>
+              </c:numCache>
+            </c:numRef>
+          </c:val>
+          <c:extLst>
+            <c:ext xmlns:c16="http://schemas.microsoft.com/office/drawing/2014/chart" uri="{C3380CC4-5D6E-409C-BE32-E72D297353CC}">
+              <c16:uniqueId val="{00000000-053E-4151-B157-E9C469A4BDE9}"/>
+            </c:ext>
+          </c:extLst>
+        </c:ser>
+        <c:ser>
+          <c:idx val="1"/>
+          <c:order val="1"/>
+          <c:tx>
+            <c:strRef>
+              <c:f>Sheet2!$B$4</c:f>
+              <c:strCache>
+                <c:ptCount val="1"/>
+                <c:pt idx="0">
+                  <c:v>human_tata_negative</c:v>
+                </c:pt>
+              </c:strCache>
+            </c:strRef>
+          </c:tx>
+          <c:spPr>
+            <a:solidFill>
+              <a:schemeClr val="accent2"/>
+            </a:solidFill>
+            <a:ln>
+              <a:noFill/>
+            </a:ln>
+            <a:effectLst/>
+          </c:spPr>
+          <c:invertIfNegative val="0"/>
+          <c:cat>
+            <c:strRef>
+              <c:f>Sheet2!$C$2:$D$2</c:f>
+              <c:strCache>
+                <c:ptCount val="2"/>
+                <c:pt idx="0">
+                  <c:v>TATA Prediction</c:v>
+                </c:pt>
+                <c:pt idx="1">
+                  <c:v>Non TATA Prediction</c:v>
+                </c:pt>
+              </c:strCache>
+            </c:strRef>
+          </c:cat>
+          <c:val>
+            <c:numRef>
+              <c:f>Sheet2!$C$4:$D$4</c:f>
+              <c:numCache>
+                <c:formatCode>0%</c:formatCode>
+                <c:ptCount val="2"/>
+                <c:pt idx="0" formatCode="0.00%">
+                  <c:v>0.54300000000000004</c:v>
+                </c:pt>
+                <c:pt idx="1">
+                  <c:v>0.81</c:v>
+                </c:pt>
+              </c:numCache>
+            </c:numRef>
+          </c:val>
+          <c:extLst>
+            <c:ext xmlns:c16="http://schemas.microsoft.com/office/drawing/2014/chart" uri="{C3380CC4-5D6E-409C-BE32-E72D297353CC}">
+              <c16:uniqueId val="{00000001-053E-4151-B157-E9C469A4BDE9}"/>
+            </c:ext>
+          </c:extLst>
+        </c:ser>
+        <c:ser>
+          <c:idx val="2"/>
+          <c:order val="2"/>
+          <c:tx>
+            <c:strRef>
+              <c:f>Sheet2!$B$5</c:f>
+              <c:strCache>
+                <c:ptCount val="1"/>
+                <c:pt idx="0">
+                  <c:v>macaca_tata_positive</c:v>
+                </c:pt>
+              </c:strCache>
+            </c:strRef>
+          </c:tx>
+          <c:spPr>
+            <a:solidFill>
+              <a:schemeClr val="accent3"/>
+            </a:solidFill>
+            <a:ln>
+              <a:noFill/>
+            </a:ln>
+            <a:effectLst/>
+          </c:spPr>
+          <c:invertIfNegative val="0"/>
+          <c:cat>
+            <c:strRef>
+              <c:f>Sheet2!$C$2:$D$2</c:f>
+              <c:strCache>
+                <c:ptCount val="2"/>
+                <c:pt idx="0">
+                  <c:v>TATA Prediction</c:v>
+                </c:pt>
+                <c:pt idx="1">
+                  <c:v>Non TATA Prediction</c:v>
+                </c:pt>
+              </c:strCache>
+            </c:strRef>
+          </c:cat>
+          <c:val>
+            <c:numRef>
+              <c:f>Sheet2!$C$5:$D$5</c:f>
+              <c:numCache>
+                <c:formatCode>0.00%</c:formatCode>
+                <c:ptCount val="2"/>
+                <c:pt idx="0">
+                  <c:v>0.44669999999999999</c:v>
+                </c:pt>
+                <c:pt idx="1">
+                  <c:v>0.19670000000000001</c:v>
+                </c:pt>
+              </c:numCache>
+            </c:numRef>
+          </c:val>
+          <c:extLst>
+            <c:ext xmlns:c16="http://schemas.microsoft.com/office/drawing/2014/chart" uri="{C3380CC4-5D6E-409C-BE32-E72D297353CC}">
+              <c16:uniqueId val="{00000002-053E-4151-B157-E9C469A4BDE9}"/>
+            </c:ext>
+          </c:extLst>
+        </c:ser>
+        <c:ser>
+          <c:idx val="3"/>
+          <c:order val="3"/>
+          <c:tx>
+            <c:strRef>
+              <c:f>Sheet2!$B$6</c:f>
+              <c:strCache>
+                <c:ptCount val="1"/>
+                <c:pt idx="0">
+                  <c:v>macaca_tata_negative</c:v>
+                </c:pt>
+              </c:strCache>
+            </c:strRef>
+          </c:tx>
+          <c:spPr>
+            <a:solidFill>
+              <a:schemeClr val="accent4"/>
+            </a:solidFill>
+            <a:ln>
+              <a:noFill/>
+            </a:ln>
+            <a:effectLst/>
+          </c:spPr>
+          <c:invertIfNegative val="0"/>
+          <c:cat>
+            <c:strRef>
+              <c:f>Sheet2!$C$2:$D$2</c:f>
+              <c:strCache>
+                <c:ptCount val="2"/>
+                <c:pt idx="0">
+                  <c:v>TATA Prediction</c:v>
+                </c:pt>
+                <c:pt idx="1">
+                  <c:v>Non TATA Prediction</c:v>
+                </c:pt>
+              </c:strCache>
+            </c:strRef>
+          </c:cat>
+          <c:val>
+            <c:numRef>
+              <c:f>Sheet2!$C$6:$D$6</c:f>
+              <c:numCache>
+                <c:formatCode>0.00%</c:formatCode>
+                <c:ptCount val="2"/>
+                <c:pt idx="0" formatCode="0%">
+                  <c:v>0.6</c:v>
+                </c:pt>
+                <c:pt idx="1">
+                  <c:v>0.28670000000000001</c:v>
+                </c:pt>
+              </c:numCache>
+            </c:numRef>
+          </c:val>
+          <c:extLst>
+            <c:ext xmlns:c16="http://schemas.microsoft.com/office/drawing/2014/chart" uri="{C3380CC4-5D6E-409C-BE32-E72D297353CC}">
+              <c16:uniqueId val="{00000003-053E-4151-B157-E9C469A4BDE9}"/>
+            </c:ext>
+          </c:extLst>
+        </c:ser>
+        <c:dLbls>
+          <c:showLegendKey val="0"/>
+          <c:showVal val="0"/>
+          <c:showCatName val="0"/>
+          <c:showSerName val="0"/>
+          <c:showPercent val="0"/>
+          <c:showBubbleSize val="0"/>
+        </c:dLbls>
+        <c:gapWidth val="219"/>
+        <c:overlap val="-27"/>
+        <c:axId val="1390412192"/>
+        <c:axId val="1390424672"/>
+      </c:barChart>
+      <c:catAx>
+        <c:axId val="1390412192"/>
+        <c:scaling>
+          <c:orientation val="minMax"/>
+        </c:scaling>
+        <c:delete val="0"/>
+        <c:axPos val="b"/>
+        <c:numFmt formatCode="General" sourceLinked="1"/>
+        <c:majorTickMark val="none"/>
+        <c:minorTickMark val="none"/>
+        <c:tickLblPos val="nextTo"/>
+        <c:spPr>
+          <a:noFill/>
+          <a:ln w="9525" cap="flat" cmpd="sng" algn="ctr">
+            <a:solidFill>
+              <a:schemeClr val="tx1">
+                <a:lumMod val="15000"/>
+                <a:lumOff val="85000"/>
+              </a:schemeClr>
+            </a:solidFill>
+            <a:round/>
+          </a:ln>
+          <a:effectLst/>
+        </c:spPr>
+        <c:txPr>
+          <a:bodyPr rot="-60000000" spcFirstLastPara="1" vertOverflow="ellipsis" vert="horz" wrap="square" anchor="ctr" anchorCtr="1"/>
+          <a:lstStyle/>
+          <a:p>
+            <a:pPr>
+              <a:defRPr sz="900" b="0" i="0" u="none" strike="noStrike" kern="1200" baseline="0">
+                <a:solidFill>
+                  <a:schemeClr val="tx1">
+                    <a:lumMod val="65000"/>
+                    <a:lumOff val="35000"/>
+                  </a:schemeClr>
+                </a:solidFill>
+                <a:latin typeface="+mn-lt"/>
+                <a:ea typeface="+mn-ea"/>
+                <a:cs typeface="+mn-cs"/>
+              </a:defRPr>
+            </a:pPr>
+            <a:endParaRPr lang="en-US"/>
+          </a:p>
+        </c:txPr>
+        <c:crossAx val="1390424672"/>
+        <c:crosses val="autoZero"/>
+        <c:auto val="1"/>
+        <c:lblAlgn val="ctr"/>
+        <c:lblOffset val="100"/>
+        <c:noMultiLvlLbl val="0"/>
+      </c:catAx>
+      <c:valAx>
+        <c:axId val="1390424672"/>
+        <c:scaling>
+          <c:orientation val="minMax"/>
+        </c:scaling>
+        <c:delete val="0"/>
+        <c:axPos val="l"/>
+        <c:majorGridlines>
+          <c:spPr>
+            <a:ln w="9525" cap="flat" cmpd="sng" algn="ctr">
+              <a:solidFill>
+                <a:schemeClr val="tx1">
+                  <a:lumMod val="15000"/>
+                  <a:lumOff val="85000"/>
+                </a:schemeClr>
+              </a:solidFill>
+              <a:round/>
+            </a:ln>
+            <a:effectLst/>
+          </c:spPr>
+        </c:majorGridlines>
+        <c:numFmt formatCode="0.00%" sourceLinked="1"/>
+        <c:majorTickMark val="none"/>
+        <c:minorTickMark val="none"/>
+        <c:tickLblPos val="nextTo"/>
+        <c:spPr>
+          <a:noFill/>
+          <a:ln>
+            <a:noFill/>
+          </a:ln>
+          <a:effectLst/>
+        </c:spPr>
+        <c:txPr>
+          <a:bodyPr rot="-60000000" spcFirstLastPara="1" vertOverflow="ellipsis" vert="horz" wrap="square" anchor="ctr" anchorCtr="1"/>
+          <a:lstStyle/>
+          <a:p>
+            <a:pPr>
+              <a:defRPr sz="900" b="0" i="0" u="none" strike="noStrike" kern="1200" baseline="0">
+                <a:solidFill>
+                  <a:schemeClr val="tx1">
+                    <a:lumMod val="65000"/>
+                    <a:lumOff val="35000"/>
+                  </a:schemeClr>
+                </a:solidFill>
+                <a:latin typeface="+mn-lt"/>
+                <a:ea typeface="+mn-ea"/>
+                <a:cs typeface="+mn-cs"/>
+              </a:defRPr>
+            </a:pPr>
+            <a:endParaRPr lang="en-US"/>
+          </a:p>
+        </c:txPr>
+        <c:crossAx val="1390412192"/>
+        <c:crosses val="autoZero"/>
+        <c:crossBetween val="between"/>
+      </c:valAx>
+      <c:spPr>
+        <a:noFill/>
+        <a:ln>
+          <a:noFill/>
+        </a:ln>
+        <a:effectLst/>
+      </c:spPr>
+    </c:plotArea>
+    <c:legend>
+      <c:legendPos val="b"/>
+      <c:overlay val="0"/>
+      <c:spPr>
+        <a:noFill/>
+        <a:ln>
+          <a:noFill/>
+        </a:ln>
+        <a:effectLst/>
+      </c:spPr>
+      <c:txPr>
+        <a:bodyPr rot="0" spcFirstLastPara="1" vertOverflow="ellipsis" vert="horz" wrap="square" anchor="ctr" anchorCtr="1"/>
+        <a:lstStyle/>
+        <a:p>
+          <a:pPr>
+            <a:defRPr sz="900" b="0" i="0" u="none" strike="noStrike" kern="1200" baseline="0">
+              <a:solidFill>
+                <a:schemeClr val="tx1">
+                  <a:lumMod val="65000"/>
+                  <a:lumOff val="35000"/>
+                </a:schemeClr>
+              </a:solidFill>
+              <a:latin typeface="+mn-lt"/>
+              <a:ea typeface="+mn-ea"/>
+              <a:cs typeface="+mn-cs"/>
+            </a:defRPr>
+          </a:pPr>
+          <a:endParaRPr lang="en-US"/>
+        </a:p>
+      </c:txPr>
+    </c:legend>
+    <c:plotVisOnly val="1"/>
+    <c:dispBlanksAs val="gap"/>
+    <c:showDLblsOverMax val="0"/>
+  </c:chart>
+  <c:spPr>
+    <a:noFill/>
+    <a:ln>
+      <a:noFill/>
+    </a:ln>
+    <a:effectLst/>
+  </c:spPr>
+  <c:txPr>
+    <a:bodyPr/>
+    <a:lstStyle/>
+    <a:p>
+      <a:pPr>
+        <a:defRPr/>
+      </a:pPr>
+      <a:endParaRPr lang="en-US"/>
+    </a:p>
+  </c:txPr>
+  <c:externalData r:id="rId3">
+    <c:autoUpdate val="0"/>
+  </c:externalData>
+</c:chartSpace>
+</file>
+
+<file path=ppt/charts/chart2.xml><?xml version="1.0" encoding="utf-8"?>
 <c:chartSpace xmlns:c="http://schemas.openxmlformats.org/drawingml/2006/chart" xmlns:a="http://schemas.openxmlformats.org/drawingml/2006/main" xmlns:r="http://schemas.openxmlformats.org/officeDocument/2006/relationships" xmlns:c16r2="http://schemas.microsoft.com/office/drawing/2015/06/chart">
   <c:date1904 val="0"/>
   <c:lang val="en-US"/>
@@ -698,7 +1203,7 @@
 </c:chartSpace>
 </file>
 
-<file path=ppt/charts/chart2.xml><?xml version="1.0" encoding="utf-8"?>
+<file path=ppt/charts/chart3.xml><?xml version="1.0" encoding="utf-8"?>
 <c:chartSpace xmlns:c="http://schemas.openxmlformats.org/drawingml/2006/chart" xmlns:a="http://schemas.openxmlformats.org/drawingml/2006/main" xmlns:r="http://schemas.openxmlformats.org/officeDocument/2006/relationships" xmlns:c16r2="http://schemas.microsoft.com/office/drawing/2015/06/chart">
   <c:date1904 val="0"/>
   <c:lang val="en-US"/>
@@ -1244,7 +1749,7 @@
 </c:chartSpace>
 </file>
 
-<file path=ppt/charts/chart3.xml><?xml version="1.0" encoding="utf-8"?>
+<file path=ppt/charts/chart4.xml><?xml version="1.0" encoding="utf-8"?>
 <c:chartSpace xmlns:c="http://schemas.openxmlformats.org/drawingml/2006/chart" xmlns:a="http://schemas.openxmlformats.org/drawingml/2006/main" xmlns:r="http://schemas.openxmlformats.org/officeDocument/2006/relationships" xmlns:c16r2="http://schemas.microsoft.com/office/drawing/2015/06/chart">
   <c:date1904 val="0"/>
   <c:lang val="en-US"/>
@@ -1795,7 +2300,7 @@
 </c:chartSpace>
 </file>
 
-<file path=ppt/charts/chart4.xml><?xml version="1.0" encoding="utf-8"?>
+<file path=ppt/charts/chart5.xml><?xml version="1.0" encoding="utf-8"?>
 <c:chartSpace xmlns:c="http://schemas.openxmlformats.org/drawingml/2006/chart" xmlns:a="http://schemas.openxmlformats.org/drawingml/2006/main" xmlns:r="http://schemas.openxmlformats.org/officeDocument/2006/relationships" xmlns:c16r2="http://schemas.microsoft.com/office/drawing/2015/06/chart">
   <c:date1904 val="0"/>
   <c:lang val="en-US"/>
@@ -2368,7 +2873,7 @@
 </c:chartSpace>
 </file>
 
-<file path=ppt/charts/chart5.xml><?xml version="1.0" encoding="utf-8"?>
+<file path=ppt/charts/chart6.xml><?xml version="1.0" encoding="utf-8"?>
 <c:chartSpace xmlns:c="http://schemas.openxmlformats.org/drawingml/2006/chart" xmlns:a="http://schemas.openxmlformats.org/drawingml/2006/main" xmlns:r="http://schemas.openxmlformats.org/officeDocument/2006/relationships" xmlns:c16r2="http://schemas.microsoft.com/office/drawing/2015/06/chart">
   <c:date1904 val="0"/>
   <c:lang val="en-US"/>
@@ -2938,7 +3443,7 @@
 </c:chartSpace>
 </file>
 
-<file path=ppt/charts/chart6.xml><?xml version="1.0" encoding="utf-8"?>
+<file path=ppt/charts/chart7.xml><?xml version="1.0" encoding="utf-8"?>
 <c:chartSpace xmlns:c="http://schemas.openxmlformats.org/drawingml/2006/chart" xmlns:a="http://schemas.openxmlformats.org/drawingml/2006/main" xmlns:r="http://schemas.openxmlformats.org/officeDocument/2006/relationships" xmlns:c16r2="http://schemas.microsoft.com/office/drawing/2015/06/chart">
   <c:date1904 val="0"/>
   <c:lang val="en-US"/>
@@ -3783,6 +4288,46 @@
 </file>
 
 <file path=ppt/charts/colors6.xml><?xml version="1.0" encoding="utf-8"?>
+<cs:colorStyle xmlns:cs="http://schemas.microsoft.com/office/drawing/2012/chartStyle" xmlns:a="http://schemas.openxmlformats.org/drawingml/2006/main" meth="cycle" id="10">
+  <a:schemeClr val="accent1"/>
+  <a:schemeClr val="accent2"/>
+  <a:schemeClr val="accent3"/>
+  <a:schemeClr val="accent4"/>
+  <a:schemeClr val="accent5"/>
+  <a:schemeClr val="accent6"/>
+  <cs:variation/>
+  <cs:variation>
+    <a:lumMod val="60000"/>
+  </cs:variation>
+  <cs:variation>
+    <a:lumMod val="80000"/>
+    <a:lumOff val="20000"/>
+  </cs:variation>
+  <cs:variation>
+    <a:lumMod val="80000"/>
+  </cs:variation>
+  <cs:variation>
+    <a:lumMod val="60000"/>
+    <a:lumOff val="40000"/>
+  </cs:variation>
+  <cs:variation>
+    <a:lumMod val="50000"/>
+  </cs:variation>
+  <cs:variation>
+    <a:lumMod val="70000"/>
+    <a:lumOff val="30000"/>
+  </cs:variation>
+  <cs:variation>
+    <a:lumMod val="70000"/>
+  </cs:variation>
+  <cs:variation>
+    <a:lumMod val="50000"/>
+    <a:lumOff val="50000"/>
+  </cs:variation>
+</cs:colorStyle>
+</file>
+
+<file path=ppt/charts/colors7.xml><?xml version="1.0" encoding="utf-8"?>
 <cs:colorStyle xmlns:cs="http://schemas.microsoft.com/office/drawing/2012/chartStyle" xmlns:a="http://schemas.openxmlformats.org/drawingml/2006/main" meth="cycle" id="10">
   <a:schemeClr val="accent1"/>
   <a:schemeClr val="accent2"/>
@@ -5332,7 +5877,7 @@
 </file>
 
 <file path=ppt/charts/style4.xml><?xml version="1.0" encoding="utf-8"?>
-<cs:chartStyle xmlns:cs="http://schemas.microsoft.com/office/drawing/2012/chartStyle" xmlns:a="http://schemas.openxmlformats.org/drawingml/2006/main" id="286">
+<cs:chartStyle xmlns:cs="http://schemas.microsoft.com/office/drawing/2012/chartStyle" xmlns:a="http://schemas.openxmlformats.org/drawingml/2006/main" id="201">
   <cs:axisTitle>
     <cs:lnRef idx="0"/>
     <cs:fillRef idx="0"/>
@@ -5355,6 +5900,17 @@
         <a:lumOff val="35000"/>
       </a:schemeClr>
     </cs:fontRef>
+    <cs:spPr>
+      <a:ln w="9525" cap="flat" cmpd="sng" algn="ctr">
+        <a:solidFill>
+          <a:schemeClr val="tx1">
+            <a:lumMod val="15000"/>
+            <a:lumOff val="85000"/>
+          </a:schemeClr>
+        </a:solidFill>
+        <a:round/>
+      </a:ln>
+    </cs:spPr>
     <cs:defRPr sz="900" kern="1200"/>
   </cs:categoryAxis>
   <cs:chartArea mods="allowNoFillOverride allowNoLineOverride">
@@ -5525,23 +6081,22 @@
     <cs:fillRef idx="0"/>
     <cs:effectRef idx="0"/>
     <cs:fontRef idx="minor">
-      <a:schemeClr val="tx1"/>
+      <a:schemeClr val="dk1"/>
     </cs:fontRef>
     <cs:spPr>
       <a:solidFill>
         <a:schemeClr val="dk1">
-          <a:lumMod val="75000"/>
-          <a:lumOff val="25000"/>
+          <a:lumMod val="65000"/>
+          <a:lumOff val="35000"/>
         </a:schemeClr>
       </a:solidFill>
-      <a:ln w="9525" cap="flat" cmpd="sng" algn="ctr">
+      <a:ln w="9525">
         <a:solidFill>
           <a:schemeClr val="tx1">
             <a:lumMod val="65000"/>
             <a:lumOff val="35000"/>
           </a:schemeClr>
         </a:solidFill>
-        <a:round/>
       </a:ln>
     </cs:spPr>
   </cs:downBar>
@@ -5646,8 +6201,8 @@
       <a:ln w="9525" cap="flat" cmpd="sng" algn="ctr">
         <a:solidFill>
           <a:schemeClr val="tx1">
-            <a:lumMod val="50000"/>
-            <a:lumOff val="50000"/>
+            <a:lumMod val="75000"/>
+            <a:lumOff val="25000"/>
           </a:schemeClr>
         </a:solidFill>
         <a:round/>
@@ -5779,20 +6334,19 @@
     <cs:fillRef idx="0"/>
     <cs:effectRef idx="0"/>
     <cs:fontRef idx="minor">
-      <a:schemeClr val="tx1"/>
+      <a:schemeClr val="dk1"/>
     </cs:fontRef>
     <cs:spPr>
       <a:solidFill>
         <a:schemeClr val="lt1"/>
       </a:solidFill>
-      <a:ln w="9525" cap="flat" cmpd="sng" algn="ctr">
+      <a:ln w="9525">
         <a:solidFill>
           <a:schemeClr val="tx1">
-            <a:lumMod val="65000"/>
-            <a:lumOff val="35000"/>
+            <a:lumMod val="15000"/>
+            <a:lumOff val="85000"/>
           </a:schemeClr>
         </a:solidFill>
-        <a:round/>
       </a:ln>
     </cs:spPr>
   </cs:upBar>
@@ -6813,6 +7367,500 @@
 </cs:chartStyle>
 </file>
 
+<file path=ppt/charts/style7.xml><?xml version="1.0" encoding="utf-8"?>
+<cs:chartStyle xmlns:cs="http://schemas.microsoft.com/office/drawing/2012/chartStyle" xmlns:a="http://schemas.openxmlformats.org/drawingml/2006/main" id="286">
+  <cs:axisTitle>
+    <cs:lnRef idx="0"/>
+    <cs:fillRef idx="0"/>
+    <cs:effectRef idx="0"/>
+    <cs:fontRef idx="minor">
+      <a:schemeClr val="tx1">
+        <a:lumMod val="65000"/>
+        <a:lumOff val="35000"/>
+      </a:schemeClr>
+    </cs:fontRef>
+    <cs:defRPr sz="1000" kern="1200"/>
+  </cs:axisTitle>
+  <cs:categoryAxis>
+    <cs:lnRef idx="0"/>
+    <cs:fillRef idx="0"/>
+    <cs:effectRef idx="0"/>
+    <cs:fontRef idx="minor">
+      <a:schemeClr val="tx1">
+        <a:lumMod val="65000"/>
+        <a:lumOff val="35000"/>
+      </a:schemeClr>
+    </cs:fontRef>
+    <cs:defRPr sz="900" kern="1200"/>
+  </cs:categoryAxis>
+  <cs:chartArea mods="allowNoFillOverride allowNoLineOverride">
+    <cs:lnRef idx="0"/>
+    <cs:fillRef idx="0"/>
+    <cs:effectRef idx="0"/>
+    <cs:fontRef idx="minor">
+      <a:schemeClr val="tx1"/>
+    </cs:fontRef>
+    <cs:spPr>
+      <a:solidFill>
+        <a:schemeClr val="bg1"/>
+      </a:solidFill>
+      <a:ln w="9525" cap="flat" cmpd="sng" algn="ctr">
+        <a:solidFill>
+          <a:schemeClr val="tx1">
+            <a:lumMod val="15000"/>
+            <a:lumOff val="85000"/>
+          </a:schemeClr>
+        </a:solidFill>
+        <a:round/>
+      </a:ln>
+    </cs:spPr>
+    <cs:defRPr sz="1000" kern="1200"/>
+  </cs:chartArea>
+  <cs:dataLabel>
+    <cs:lnRef idx="0"/>
+    <cs:fillRef idx="0"/>
+    <cs:effectRef idx="0"/>
+    <cs:fontRef idx="minor">
+      <a:schemeClr val="tx1">
+        <a:lumMod val="75000"/>
+        <a:lumOff val="25000"/>
+      </a:schemeClr>
+    </cs:fontRef>
+    <cs:defRPr sz="900" kern="1200"/>
+  </cs:dataLabel>
+  <cs:dataLabelCallout>
+    <cs:lnRef idx="0"/>
+    <cs:fillRef idx="0"/>
+    <cs:effectRef idx="0"/>
+    <cs:fontRef idx="minor">
+      <a:schemeClr val="dk1">
+        <a:lumMod val="65000"/>
+        <a:lumOff val="35000"/>
+      </a:schemeClr>
+    </cs:fontRef>
+    <cs:spPr>
+      <a:solidFill>
+        <a:schemeClr val="lt1"/>
+      </a:solidFill>
+      <a:ln>
+        <a:solidFill>
+          <a:schemeClr val="dk1">
+            <a:lumMod val="25000"/>
+            <a:lumOff val="75000"/>
+          </a:schemeClr>
+        </a:solidFill>
+      </a:ln>
+    </cs:spPr>
+    <cs:defRPr sz="900" kern="1200"/>
+    <cs:bodyPr rot="0" spcFirstLastPara="1" vertOverflow="clip" horzOverflow="clip" vert="horz" wrap="square" lIns="36576" tIns="18288" rIns="36576" bIns="18288" anchor="ctr" anchorCtr="1">
+      <a:spAutoFit/>
+    </cs:bodyPr>
+  </cs:dataLabelCallout>
+  <cs:dataPoint>
+    <cs:lnRef idx="0"/>
+    <cs:fillRef idx="1">
+      <cs:styleClr val="auto"/>
+    </cs:fillRef>
+    <cs:effectRef idx="0"/>
+    <cs:fontRef idx="minor">
+      <a:schemeClr val="tx1"/>
+    </cs:fontRef>
+  </cs:dataPoint>
+  <cs:dataPoint3D>
+    <cs:lnRef idx="0"/>
+    <cs:fillRef idx="1">
+      <cs:styleClr val="auto"/>
+    </cs:fillRef>
+    <cs:effectRef idx="0"/>
+    <cs:fontRef idx="minor">
+      <a:schemeClr val="tx1"/>
+    </cs:fontRef>
+  </cs:dataPoint3D>
+  <cs:dataPointLine>
+    <cs:lnRef idx="0">
+      <cs:styleClr val="auto"/>
+    </cs:lnRef>
+    <cs:fillRef idx="1"/>
+    <cs:effectRef idx="0"/>
+    <cs:fontRef idx="minor">
+      <a:schemeClr val="tx1"/>
+    </cs:fontRef>
+    <cs:spPr>
+      <a:ln w="28575" cap="rnd">
+        <a:solidFill>
+          <a:schemeClr val="phClr"/>
+        </a:solidFill>
+        <a:round/>
+      </a:ln>
+    </cs:spPr>
+  </cs:dataPointLine>
+  <cs:dataPointMarker>
+    <cs:lnRef idx="0">
+      <cs:styleClr val="auto"/>
+    </cs:lnRef>
+    <cs:fillRef idx="1">
+      <cs:styleClr val="auto"/>
+    </cs:fillRef>
+    <cs:effectRef idx="0"/>
+    <cs:fontRef idx="minor">
+      <a:schemeClr val="tx1"/>
+    </cs:fontRef>
+    <cs:spPr>
+      <a:ln w="9525">
+        <a:solidFill>
+          <a:schemeClr val="phClr"/>
+        </a:solidFill>
+      </a:ln>
+    </cs:spPr>
+  </cs:dataPointMarker>
+  <cs:dataPointMarkerLayout symbol="circle" size="5"/>
+  <cs:dataPointWireframe>
+    <cs:lnRef idx="0">
+      <cs:styleClr val="auto"/>
+    </cs:lnRef>
+    <cs:fillRef idx="1"/>
+    <cs:effectRef idx="0"/>
+    <cs:fontRef idx="minor">
+      <a:schemeClr val="tx1"/>
+    </cs:fontRef>
+    <cs:spPr>
+      <a:ln w="9525" cap="rnd">
+        <a:solidFill>
+          <a:schemeClr val="phClr"/>
+        </a:solidFill>
+        <a:round/>
+      </a:ln>
+    </cs:spPr>
+  </cs:dataPointWireframe>
+  <cs:dataTable>
+    <cs:lnRef idx="0"/>
+    <cs:fillRef idx="0"/>
+    <cs:effectRef idx="0"/>
+    <cs:fontRef idx="minor">
+      <a:schemeClr val="tx1">
+        <a:lumMod val="65000"/>
+        <a:lumOff val="35000"/>
+      </a:schemeClr>
+    </cs:fontRef>
+    <cs:spPr>
+      <a:noFill/>
+      <a:ln w="9525" cap="flat" cmpd="sng" algn="ctr">
+        <a:solidFill>
+          <a:schemeClr val="tx1">
+            <a:lumMod val="15000"/>
+            <a:lumOff val="85000"/>
+          </a:schemeClr>
+        </a:solidFill>
+        <a:round/>
+      </a:ln>
+    </cs:spPr>
+    <cs:defRPr sz="900" kern="1200"/>
+  </cs:dataTable>
+  <cs:downBar>
+    <cs:lnRef idx="0"/>
+    <cs:fillRef idx="0"/>
+    <cs:effectRef idx="0"/>
+    <cs:fontRef idx="minor">
+      <a:schemeClr val="tx1"/>
+    </cs:fontRef>
+    <cs:spPr>
+      <a:solidFill>
+        <a:schemeClr val="dk1">
+          <a:lumMod val="75000"/>
+          <a:lumOff val="25000"/>
+        </a:schemeClr>
+      </a:solidFill>
+      <a:ln w="9525" cap="flat" cmpd="sng" algn="ctr">
+        <a:solidFill>
+          <a:schemeClr val="tx1">
+            <a:lumMod val="65000"/>
+            <a:lumOff val="35000"/>
+          </a:schemeClr>
+        </a:solidFill>
+        <a:round/>
+      </a:ln>
+    </cs:spPr>
+  </cs:downBar>
+  <cs:dropLine>
+    <cs:lnRef idx="0"/>
+    <cs:fillRef idx="0"/>
+    <cs:effectRef idx="0"/>
+    <cs:fontRef idx="minor">
+      <a:schemeClr val="tx1"/>
+    </cs:fontRef>
+    <cs:spPr>
+      <a:ln w="9525" cap="flat" cmpd="sng" algn="ctr">
+        <a:solidFill>
+          <a:schemeClr val="tx1">
+            <a:lumMod val="35000"/>
+            <a:lumOff val="65000"/>
+          </a:schemeClr>
+        </a:solidFill>
+        <a:round/>
+      </a:ln>
+    </cs:spPr>
+  </cs:dropLine>
+  <cs:errorBar>
+    <cs:lnRef idx="0"/>
+    <cs:fillRef idx="0"/>
+    <cs:effectRef idx="0"/>
+    <cs:fontRef idx="minor">
+      <a:schemeClr val="tx1"/>
+    </cs:fontRef>
+    <cs:spPr>
+      <a:ln w="9525" cap="flat" cmpd="sng" algn="ctr">
+        <a:solidFill>
+          <a:schemeClr val="tx1">
+            <a:lumMod val="65000"/>
+            <a:lumOff val="35000"/>
+          </a:schemeClr>
+        </a:solidFill>
+        <a:round/>
+      </a:ln>
+    </cs:spPr>
+  </cs:errorBar>
+  <cs:floor>
+    <cs:lnRef idx="0"/>
+    <cs:fillRef idx="0"/>
+    <cs:effectRef idx="0"/>
+    <cs:fontRef idx="minor">
+      <a:schemeClr val="tx1"/>
+    </cs:fontRef>
+    <cs:spPr>
+      <a:noFill/>
+      <a:ln>
+        <a:noFill/>
+      </a:ln>
+    </cs:spPr>
+  </cs:floor>
+  <cs:gridlineMajor>
+    <cs:lnRef idx="0"/>
+    <cs:fillRef idx="0"/>
+    <cs:effectRef idx="0"/>
+    <cs:fontRef idx="minor">
+      <a:schemeClr val="tx1"/>
+    </cs:fontRef>
+    <cs:spPr>
+      <a:ln w="9525" cap="flat" cmpd="sng" algn="ctr">
+        <a:solidFill>
+          <a:schemeClr val="tx1">
+            <a:lumMod val="15000"/>
+            <a:lumOff val="85000"/>
+          </a:schemeClr>
+        </a:solidFill>
+        <a:round/>
+      </a:ln>
+    </cs:spPr>
+  </cs:gridlineMajor>
+  <cs:gridlineMinor>
+    <cs:lnRef idx="0"/>
+    <cs:fillRef idx="0"/>
+    <cs:effectRef idx="0"/>
+    <cs:fontRef idx="minor">
+      <a:schemeClr val="tx1"/>
+    </cs:fontRef>
+    <cs:spPr>
+      <a:ln w="9525" cap="flat" cmpd="sng" algn="ctr">
+        <a:solidFill>
+          <a:schemeClr val="tx1">
+            <a:lumMod val="5000"/>
+            <a:lumOff val="95000"/>
+          </a:schemeClr>
+        </a:solidFill>
+        <a:round/>
+      </a:ln>
+    </cs:spPr>
+  </cs:gridlineMinor>
+  <cs:hiLoLine>
+    <cs:lnRef idx="0"/>
+    <cs:fillRef idx="0"/>
+    <cs:effectRef idx="0"/>
+    <cs:fontRef idx="minor">
+      <a:schemeClr val="tx1"/>
+    </cs:fontRef>
+    <cs:spPr>
+      <a:ln w="9525" cap="flat" cmpd="sng" algn="ctr">
+        <a:solidFill>
+          <a:schemeClr val="tx1">
+            <a:lumMod val="50000"/>
+            <a:lumOff val="50000"/>
+          </a:schemeClr>
+        </a:solidFill>
+        <a:round/>
+      </a:ln>
+    </cs:spPr>
+  </cs:hiLoLine>
+  <cs:leaderLine>
+    <cs:lnRef idx="0"/>
+    <cs:fillRef idx="0"/>
+    <cs:effectRef idx="0"/>
+    <cs:fontRef idx="minor">
+      <a:schemeClr val="tx1"/>
+    </cs:fontRef>
+    <cs:spPr>
+      <a:ln w="9525" cap="flat" cmpd="sng" algn="ctr">
+        <a:solidFill>
+          <a:schemeClr val="tx1">
+            <a:lumMod val="35000"/>
+            <a:lumOff val="65000"/>
+          </a:schemeClr>
+        </a:solidFill>
+        <a:round/>
+      </a:ln>
+    </cs:spPr>
+  </cs:leaderLine>
+  <cs:legend>
+    <cs:lnRef idx="0"/>
+    <cs:fillRef idx="0"/>
+    <cs:effectRef idx="0"/>
+    <cs:fontRef idx="minor">
+      <a:schemeClr val="tx1">
+        <a:lumMod val="65000"/>
+        <a:lumOff val="35000"/>
+      </a:schemeClr>
+    </cs:fontRef>
+    <cs:defRPr sz="900" kern="1200"/>
+  </cs:legend>
+  <cs:plotArea mods="allowNoFillOverride allowNoLineOverride">
+    <cs:lnRef idx="0"/>
+    <cs:fillRef idx="0"/>
+    <cs:effectRef idx="0"/>
+    <cs:fontRef idx="minor">
+      <a:schemeClr val="tx1"/>
+    </cs:fontRef>
+  </cs:plotArea>
+  <cs:plotArea3D mods="allowNoFillOverride allowNoLineOverride">
+    <cs:lnRef idx="0"/>
+    <cs:fillRef idx="0"/>
+    <cs:effectRef idx="0"/>
+    <cs:fontRef idx="minor">
+      <a:schemeClr val="tx1"/>
+    </cs:fontRef>
+  </cs:plotArea3D>
+  <cs:seriesAxis>
+    <cs:lnRef idx="0"/>
+    <cs:fillRef idx="0"/>
+    <cs:effectRef idx="0"/>
+    <cs:fontRef idx="minor">
+      <a:schemeClr val="tx1">
+        <a:lumMod val="65000"/>
+        <a:lumOff val="35000"/>
+      </a:schemeClr>
+    </cs:fontRef>
+    <cs:defRPr sz="900" kern="1200"/>
+  </cs:seriesAxis>
+  <cs:seriesLine>
+    <cs:lnRef idx="0"/>
+    <cs:fillRef idx="0"/>
+    <cs:effectRef idx="0"/>
+    <cs:fontRef idx="minor">
+      <a:schemeClr val="tx1"/>
+    </cs:fontRef>
+    <cs:spPr>
+      <a:ln w="9525" cap="flat" cmpd="sng" algn="ctr">
+        <a:solidFill>
+          <a:schemeClr val="tx1">
+            <a:lumMod val="35000"/>
+            <a:lumOff val="65000"/>
+          </a:schemeClr>
+        </a:solidFill>
+        <a:round/>
+      </a:ln>
+    </cs:spPr>
+  </cs:seriesLine>
+  <cs:title>
+    <cs:lnRef idx="0"/>
+    <cs:fillRef idx="0"/>
+    <cs:effectRef idx="0"/>
+    <cs:fontRef idx="minor">
+      <a:schemeClr val="tx1">
+        <a:lumMod val="65000"/>
+        <a:lumOff val="35000"/>
+      </a:schemeClr>
+    </cs:fontRef>
+    <cs:defRPr sz="1400" b="0" kern="1200" spc="0" baseline="0"/>
+  </cs:title>
+  <cs:trendline>
+    <cs:lnRef idx="0">
+      <cs:styleClr val="auto"/>
+    </cs:lnRef>
+    <cs:fillRef idx="0"/>
+    <cs:effectRef idx="0"/>
+    <cs:fontRef idx="minor">
+      <a:schemeClr val="tx1"/>
+    </cs:fontRef>
+    <cs:spPr>
+      <a:ln w="19050" cap="rnd">
+        <a:solidFill>
+          <a:schemeClr val="phClr"/>
+        </a:solidFill>
+        <a:prstDash val="sysDot"/>
+      </a:ln>
+    </cs:spPr>
+  </cs:trendline>
+  <cs:trendlineLabel>
+    <cs:lnRef idx="0"/>
+    <cs:fillRef idx="0"/>
+    <cs:effectRef idx="0"/>
+    <cs:fontRef idx="minor">
+      <a:schemeClr val="tx1">
+        <a:lumMod val="65000"/>
+        <a:lumOff val="35000"/>
+      </a:schemeClr>
+    </cs:fontRef>
+    <cs:defRPr sz="900" kern="1200"/>
+  </cs:trendlineLabel>
+  <cs:upBar>
+    <cs:lnRef idx="0"/>
+    <cs:fillRef idx="0"/>
+    <cs:effectRef idx="0"/>
+    <cs:fontRef idx="minor">
+      <a:schemeClr val="tx1"/>
+    </cs:fontRef>
+    <cs:spPr>
+      <a:solidFill>
+        <a:schemeClr val="lt1"/>
+      </a:solidFill>
+      <a:ln w="9525" cap="flat" cmpd="sng" algn="ctr">
+        <a:solidFill>
+          <a:schemeClr val="tx1">
+            <a:lumMod val="65000"/>
+            <a:lumOff val="35000"/>
+          </a:schemeClr>
+        </a:solidFill>
+        <a:round/>
+      </a:ln>
+    </cs:spPr>
+  </cs:upBar>
+  <cs:valueAxis>
+    <cs:lnRef idx="0"/>
+    <cs:fillRef idx="0"/>
+    <cs:effectRef idx="0"/>
+    <cs:fontRef idx="minor">
+      <a:schemeClr val="tx1">
+        <a:lumMod val="65000"/>
+        <a:lumOff val="35000"/>
+      </a:schemeClr>
+    </cs:fontRef>
+    <cs:defRPr sz="900" kern="1200"/>
+  </cs:valueAxis>
+  <cs:wall>
+    <cs:lnRef idx="0"/>
+    <cs:fillRef idx="0"/>
+    <cs:effectRef idx="0"/>
+    <cs:fontRef idx="minor">
+      <a:schemeClr val="tx1"/>
+    </cs:fontRef>
+    <cs:spPr>
+      <a:noFill/>
+      <a:ln>
+        <a:noFill/>
+      </a:ln>
+    </cs:spPr>
+  </cs:wall>
+</cs:chartStyle>
+</file>
+
 <file path=ppt/comments/comment1.xml><?xml version="1.0" encoding="utf-8"?>
 <p:cmLst xmlns:a="http://schemas.openxmlformats.org/drawingml/2006/main" xmlns:r="http://schemas.openxmlformats.org/officeDocument/2006/relationships" xmlns:p="http://schemas.openxmlformats.org/presentationml/2006/main">
   <p:cm authorId="1" dt="2021-08-17T09:13:52.209" idx="2">
@@ -10169,6 +11217,476 @@
           <p:cNvPr id="2" name="Title 1">
             <a:extLst>
               <a:ext uri="{FF2B5EF4-FFF2-40B4-BE49-F238E27FC236}">
+                <a16:creationId xmlns:a16="http://schemas.microsoft.com/office/drawing/2014/main" id="{0FCEBAD1-D6BA-410C-8D4E-2A4246C18FF5}"/>
+              </a:ext>
+            </a:extLst>
+          </p:cNvPr>
+          <p:cNvSpPr>
+            <a:spLocks noGrp="1"/>
+          </p:cNvSpPr>
+          <p:nvPr>
+            <p:ph type="title"/>
+          </p:nvPr>
+        </p:nvSpPr>
+        <p:spPr/>
+        <p:txBody>
+          <a:bodyPr/>
+          <a:lstStyle/>
+          <a:p>
+            <a:r>
+              <a:rPr lang="en-US" dirty="0"/>
+              <a:t>Promoter Detection</a:t>
+            </a:r>
+            <a:endParaRPr lang="en-ID" dirty="0"/>
+          </a:p>
+        </p:txBody>
+      </p:sp>
+      <p:sp>
+        <p:nvSpPr>
+          <p:cNvPr id="3" name="Content Placeholder 2">
+            <a:extLst>
+              <a:ext uri="{FF2B5EF4-FFF2-40B4-BE49-F238E27FC236}">
+                <a16:creationId xmlns:a16="http://schemas.microsoft.com/office/drawing/2014/main" id="{BA715C03-2461-4530-BCC0-D070505651A5}"/>
+              </a:ext>
+            </a:extLst>
+          </p:cNvPr>
+          <p:cNvSpPr>
+            <a:spLocks noGrp="1"/>
+          </p:cNvSpPr>
+          <p:nvPr>
+            <p:ph idx="1"/>
+          </p:nvPr>
+        </p:nvSpPr>
+        <p:spPr/>
+        <p:txBody>
+          <a:bodyPr/>
+          <a:lstStyle/>
+          <a:p>
+            <a:r>
+              <a:rPr lang="en-US" dirty="0"/>
+              <a:t>TATA-box </a:t>
+            </a:r>
+            <a:r>
+              <a:rPr lang="en-US" dirty="0" err="1"/>
+              <a:t>adalah</a:t>
+            </a:r>
+            <a:r>
+              <a:rPr lang="en-US" dirty="0"/>
+              <a:t> promotor yang </a:t>
+            </a:r>
+            <a:r>
+              <a:rPr lang="en-US" dirty="0" err="1"/>
+              <a:t>terdiri</a:t>
+            </a:r>
+            <a:r>
+              <a:rPr lang="en-US" dirty="0"/>
+              <a:t> </a:t>
+            </a:r>
+            <a:r>
+              <a:rPr lang="en-US" dirty="0" err="1"/>
+              <a:t>dari</a:t>
+            </a:r>
+            <a:r>
+              <a:rPr lang="en-US" dirty="0"/>
+              <a:t> T dan A yang </a:t>
+            </a:r>
+            <a:r>
+              <a:rPr lang="en-US" dirty="0" err="1"/>
+              <a:t>berulang</a:t>
+            </a:r>
+            <a:r>
+              <a:rPr lang="en-US" dirty="0"/>
+              <a:t> (TATAAA)</a:t>
+            </a:r>
+          </a:p>
+          <a:p>
+            <a:pPr lvl="1"/>
+            <a:r>
+              <a:rPr lang="en-US" dirty="0"/>
+              <a:t>Problem : Belum </a:t>
+            </a:r>
+            <a:r>
+              <a:rPr lang="en-US" dirty="0" err="1"/>
+              <a:t>tentu</a:t>
+            </a:r>
+            <a:r>
+              <a:rPr lang="en-US" dirty="0"/>
+              <a:t> </a:t>
+            </a:r>
+            <a:r>
+              <a:rPr lang="en-US" dirty="0" err="1"/>
+              <a:t>tiap</a:t>
+            </a:r>
+            <a:r>
+              <a:rPr lang="en-US" dirty="0"/>
+              <a:t> </a:t>
+            </a:r>
+            <a:r>
+              <a:rPr lang="en-US" dirty="0" err="1"/>
+              <a:t>sekuens</a:t>
+            </a:r>
+            <a:r>
+              <a:rPr lang="en-US" dirty="0"/>
+              <a:t> </a:t>
+            </a:r>
+            <a:r>
+              <a:rPr lang="en-US" b="1" dirty="0"/>
+              <a:t>TATAAA</a:t>
+            </a:r>
+            <a:r>
+              <a:rPr lang="en-US" dirty="0"/>
+              <a:t> </a:t>
+            </a:r>
+            <a:r>
+              <a:rPr lang="en-US" dirty="0" err="1"/>
+              <a:t>adalah</a:t>
+            </a:r>
+            <a:r>
+              <a:rPr lang="en-US" dirty="0"/>
+              <a:t> promoter</a:t>
+            </a:r>
+            <a:endParaRPr lang="en-ID" dirty="0"/>
+          </a:p>
+          <a:p>
+            <a:r>
+              <a:rPr lang="en-ID" dirty="0"/>
+              <a:t>Hal yang </a:t>
+            </a:r>
+            <a:r>
+              <a:rPr lang="en-ID" dirty="0" err="1"/>
+              <a:t>sama</a:t>
+            </a:r>
+            <a:r>
+              <a:rPr lang="en-ID" dirty="0"/>
+              <a:t> </a:t>
+            </a:r>
+            <a:r>
+              <a:rPr lang="en-ID" dirty="0" err="1"/>
+              <a:t>berlaku</a:t>
+            </a:r>
+            <a:r>
+              <a:rPr lang="en-ID" dirty="0"/>
+              <a:t> pada promoter CAAT-Box dan GC-Box</a:t>
+            </a:r>
+          </a:p>
+          <a:p>
+            <a:pPr lvl="1"/>
+            <a:r>
+              <a:rPr lang="en-ID" dirty="0"/>
+              <a:t>CAAT-Box </a:t>
+            </a:r>
+            <a:r>
+              <a:rPr lang="en-ID" dirty="0" err="1"/>
+              <a:t>atau</a:t>
+            </a:r>
+            <a:r>
+              <a:rPr lang="en-ID" dirty="0"/>
+              <a:t> CCAAT-Box </a:t>
+            </a:r>
+            <a:r>
+              <a:rPr lang="en-ID" dirty="0" err="1"/>
+              <a:t>adalah</a:t>
+            </a:r>
+            <a:r>
+              <a:rPr lang="en-ID" dirty="0"/>
+              <a:t> promoter </a:t>
+            </a:r>
+            <a:r>
+              <a:rPr lang="en-ID" dirty="0" err="1"/>
+              <a:t>dengan</a:t>
+            </a:r>
+            <a:r>
+              <a:rPr lang="en-ID" dirty="0"/>
+              <a:t> </a:t>
+            </a:r>
+            <a:r>
+              <a:rPr lang="en-ID" dirty="0" err="1"/>
+              <a:t>sekuens</a:t>
+            </a:r>
+            <a:r>
+              <a:rPr lang="en-ID" dirty="0"/>
+              <a:t> </a:t>
+            </a:r>
+            <a:r>
+              <a:rPr lang="en-ID" b="1" dirty="0"/>
+              <a:t>GGCCAATCT</a:t>
+            </a:r>
+            <a:r>
+              <a:rPr lang="en-ID" dirty="0"/>
+              <a:t>.</a:t>
+            </a:r>
+          </a:p>
+          <a:p>
+            <a:pPr lvl="1"/>
+            <a:r>
+              <a:rPr lang="en-ID" dirty="0"/>
+              <a:t>GC-Box </a:t>
+            </a:r>
+            <a:r>
+              <a:rPr lang="en-ID" dirty="0" err="1"/>
+              <a:t>adalah</a:t>
+            </a:r>
+            <a:r>
+              <a:rPr lang="en-ID" dirty="0"/>
+              <a:t> promoter </a:t>
+            </a:r>
+            <a:r>
+              <a:rPr lang="en-ID" dirty="0" err="1"/>
+              <a:t>dengan</a:t>
+            </a:r>
+            <a:r>
+              <a:rPr lang="en-ID" dirty="0"/>
+              <a:t> </a:t>
+            </a:r>
+            <a:r>
+              <a:rPr lang="en-ID" dirty="0" err="1"/>
+              <a:t>sekuens</a:t>
+            </a:r>
+            <a:r>
+              <a:rPr lang="en-ID" dirty="0"/>
+              <a:t> </a:t>
+            </a:r>
+            <a:r>
+              <a:rPr lang="en-ID" b="1" dirty="0"/>
+              <a:t>GGGCGG</a:t>
+            </a:r>
+            <a:r>
+              <a:rPr lang="en-ID" dirty="0"/>
+              <a:t>.</a:t>
+            </a:r>
+          </a:p>
+          <a:p>
+            <a:r>
+              <a:rPr lang="en-ID" dirty="0"/>
+              <a:t>Pada “</a:t>
+            </a:r>
+            <a:r>
+              <a:rPr lang="en-ID" dirty="0" err="1"/>
+              <a:t>konteks</a:t>
+            </a:r>
+            <a:r>
+              <a:rPr lang="en-ID" dirty="0"/>
+              <a:t>” </a:t>
+            </a:r>
+            <a:r>
+              <a:rPr lang="en-ID" dirty="0" err="1"/>
+              <a:t>tertentu</a:t>
+            </a:r>
+            <a:r>
+              <a:rPr lang="en-ID" dirty="0"/>
+              <a:t> TATA-box, CAAT-Box, dan GC-Box </a:t>
+            </a:r>
+            <a:r>
+              <a:rPr lang="en-ID" dirty="0" err="1"/>
+              <a:t>adalah</a:t>
+            </a:r>
+            <a:r>
+              <a:rPr lang="en-ID" dirty="0"/>
+              <a:t> promoter. Pada </a:t>
+            </a:r>
+            <a:r>
+              <a:rPr lang="en-ID" dirty="0" err="1"/>
+              <a:t>konteks</a:t>
+            </a:r>
+            <a:r>
+              <a:rPr lang="en-ID" dirty="0"/>
+              <a:t> yang lain </a:t>
+            </a:r>
+            <a:r>
+              <a:rPr lang="en-ID" dirty="0" err="1"/>
+              <a:t>boleh</a:t>
+            </a:r>
+            <a:r>
+              <a:rPr lang="en-ID" dirty="0"/>
+              <a:t> </a:t>
+            </a:r>
+            <a:r>
+              <a:rPr lang="en-ID" dirty="0" err="1"/>
+              <a:t>jadi</a:t>
+            </a:r>
+            <a:r>
+              <a:rPr lang="en-ID" dirty="0"/>
+              <a:t> </a:t>
+            </a:r>
+            <a:r>
+              <a:rPr lang="en-ID" dirty="0" err="1"/>
+              <a:t>sekuens</a:t>
+            </a:r>
+            <a:r>
+              <a:rPr lang="en-ID" dirty="0"/>
+              <a:t> </a:t>
+            </a:r>
+            <a:r>
+              <a:rPr lang="en-ID" dirty="0" err="1"/>
+              <a:t>ini</a:t>
+            </a:r>
+            <a:r>
+              <a:rPr lang="en-ID" dirty="0"/>
+              <a:t> </a:t>
+            </a:r>
+            <a:r>
+              <a:rPr lang="en-ID" dirty="0" err="1"/>
+              <a:t>bermakna</a:t>
+            </a:r>
+            <a:r>
+              <a:rPr lang="en-ID" dirty="0"/>
+              <a:t> lain, mis. </a:t>
+            </a:r>
+            <a:r>
+              <a:rPr lang="en-ID" dirty="0" err="1"/>
+              <a:t>asam</a:t>
+            </a:r>
+            <a:r>
+              <a:rPr lang="en-ID" dirty="0"/>
+              <a:t> amino.</a:t>
+            </a:r>
+          </a:p>
+          <a:p>
+            <a:endParaRPr lang="en-US" dirty="0"/>
+          </a:p>
+        </p:txBody>
+      </p:sp>
+    </p:spTree>
+    <p:extLst>
+      <p:ext uri="{BB962C8B-B14F-4D97-AF65-F5344CB8AC3E}">
+        <p14:creationId xmlns:p14="http://schemas.microsoft.com/office/powerpoint/2010/main" val="393952906"/>
+      </p:ext>
+    </p:extLst>
+  </p:cSld>
+  <p:clrMapOvr>
+    <a:masterClrMapping/>
+  </p:clrMapOvr>
+</p:sld>
+</file>
+
+<file path=ppt/slides/slide11.xml><?xml version="1.0" encoding="utf-8"?>
+<p:sld xmlns:a="http://schemas.openxmlformats.org/drawingml/2006/main" xmlns:r="http://schemas.openxmlformats.org/officeDocument/2006/relationships" xmlns:p="http://schemas.openxmlformats.org/presentationml/2006/main">
+  <p:cSld>
+    <p:spTree>
+      <p:nvGrpSpPr>
+        <p:cNvPr id="1" name=""/>
+        <p:cNvGrpSpPr/>
+        <p:nvPr/>
+      </p:nvGrpSpPr>
+      <p:grpSpPr>
+        <a:xfrm>
+          <a:off x="0" y="0"/>
+          <a:ext cx="0" cy="0"/>
+          <a:chOff x="0" y="0"/>
+          <a:chExt cx="0" cy="0"/>
+        </a:xfrm>
+      </p:grpSpPr>
+      <p:sp>
+        <p:nvSpPr>
+          <p:cNvPr id="2" name="Title 1">
+            <a:extLst>
+              <a:ext uri="{FF2B5EF4-FFF2-40B4-BE49-F238E27FC236}">
+                <a16:creationId xmlns:a16="http://schemas.microsoft.com/office/drawing/2014/main" id="{667CA607-5394-447F-8DA5-3895D5ED35CE}"/>
+              </a:ext>
+            </a:extLst>
+          </p:cNvPr>
+          <p:cNvSpPr>
+            <a:spLocks noGrp="1"/>
+          </p:cNvSpPr>
+          <p:nvPr>
+            <p:ph type="title"/>
+          </p:nvPr>
+        </p:nvSpPr>
+        <p:spPr/>
+        <p:txBody>
+          <a:bodyPr/>
+          <a:lstStyle/>
+          <a:p>
+            <a:r>
+              <a:rPr lang="en-US" dirty="0" err="1"/>
+              <a:t>Prediksi</a:t>
+            </a:r>
+            <a:r>
+              <a:rPr lang="en-US" dirty="0"/>
+              <a:t> TATA Promoter </a:t>
+            </a:r>
+            <a:r>
+              <a:rPr lang="en-US" dirty="0" err="1"/>
+              <a:t>dari</a:t>
+            </a:r>
+            <a:r>
+              <a:rPr lang="en-US" dirty="0"/>
+              <a:t> DNA </a:t>
+            </a:r>
+            <a:r>
+              <a:rPr lang="en-US" dirty="0" err="1"/>
+              <a:t>Manusia</a:t>
+            </a:r>
+            <a:endParaRPr lang="en-ID" dirty="0"/>
+          </a:p>
+        </p:txBody>
+      </p:sp>
+      <p:graphicFrame>
+        <p:nvGraphicFramePr>
+          <p:cNvPr id="4" name="Content Placeholder 3">
+            <a:extLst>
+              <a:ext uri="{FF2B5EF4-FFF2-40B4-BE49-F238E27FC236}">
+                <a16:creationId xmlns:a16="http://schemas.microsoft.com/office/drawing/2014/main" id="{F37CF49E-5604-4919-87C6-040791FF9490}"/>
+              </a:ext>
+            </a:extLst>
+          </p:cNvPr>
+          <p:cNvGraphicFramePr>
+            <a:graphicFrameLocks noGrp="1"/>
+          </p:cNvGraphicFramePr>
+          <p:nvPr>
+            <p:ph idx="1"/>
+            <p:extLst>
+              <p:ext uri="{D42A27DB-BD31-4B8C-83A1-F6EECF244321}">
+                <p14:modId xmlns:p14="http://schemas.microsoft.com/office/powerpoint/2010/main" val="3990138410"/>
+              </p:ext>
+            </p:extLst>
+          </p:nvPr>
+        </p:nvGraphicFramePr>
+        <p:xfrm>
+          <a:off x="838200" y="1825625"/>
+          <a:ext cx="10515600" cy="4351338"/>
+        </p:xfrm>
+        <a:graphic>
+          <a:graphicData uri="http://schemas.openxmlformats.org/drawingml/2006/chart">
+            <c:chart xmlns:c="http://schemas.openxmlformats.org/drawingml/2006/chart" xmlns:r="http://schemas.openxmlformats.org/officeDocument/2006/relationships" r:id="rId2"/>
+          </a:graphicData>
+        </a:graphic>
+      </p:graphicFrame>
+    </p:spTree>
+    <p:extLst>
+      <p:ext uri="{BB962C8B-B14F-4D97-AF65-F5344CB8AC3E}">
+        <p14:creationId xmlns:p14="http://schemas.microsoft.com/office/powerpoint/2010/main" val="1435027007"/>
+      </p:ext>
+    </p:extLst>
+  </p:cSld>
+  <p:clrMapOvr>
+    <a:masterClrMapping/>
+  </p:clrMapOvr>
+</p:sld>
+</file>
+
+<file path=ppt/slides/slide12.xml><?xml version="1.0" encoding="utf-8"?>
+<p:sld xmlns:a="http://schemas.openxmlformats.org/drawingml/2006/main" xmlns:r="http://schemas.openxmlformats.org/officeDocument/2006/relationships" xmlns:p="http://schemas.openxmlformats.org/presentationml/2006/main">
+  <p:cSld>
+    <p:spTree>
+      <p:nvGrpSpPr>
+        <p:cNvPr id="1" name=""/>
+        <p:cNvGrpSpPr/>
+        <p:nvPr/>
+      </p:nvGrpSpPr>
+      <p:grpSpPr>
+        <a:xfrm>
+          <a:off x="0" y="0"/>
+          <a:ext cx="0" cy="0"/>
+          <a:chOff x="0" y="0"/>
+          <a:chExt cx="0" cy="0"/>
+        </a:xfrm>
+      </p:grpSpPr>
+      <p:sp>
+        <p:nvSpPr>
+          <p:cNvPr id="2" name="Title 1">
+            <a:extLst>
+              <a:ext uri="{FF2B5EF4-FFF2-40B4-BE49-F238E27FC236}">
                 <a16:creationId xmlns:a16="http://schemas.microsoft.com/office/drawing/2014/main" id="{191ACB27-1798-4A35-957A-A5F3B7717813}"/>
               </a:ext>
             </a:extLst>
@@ -10248,7 +11766,7 @@
 </p:sld>
 </file>
 
-<file path=ppt/slides/slide11.xml><?xml version="1.0" encoding="utf-8"?>
+<file path=ppt/slides/slide13.xml><?xml version="1.0" encoding="utf-8"?>
 <p:sld xmlns:a="http://schemas.openxmlformats.org/drawingml/2006/main" xmlns:r="http://schemas.openxmlformats.org/officeDocument/2006/relationships" xmlns:p="http://schemas.openxmlformats.org/presentationml/2006/main">
   <p:cSld>
     <p:spTree>
@@ -10674,7 +12192,7 @@
 </p:sld>
 </file>
 
-<file path=ppt/slides/slide12.xml><?xml version="1.0" encoding="utf-8"?>
+<file path=ppt/slides/slide14.xml><?xml version="1.0" encoding="utf-8"?>
 <p:sld xmlns:a="http://schemas.openxmlformats.org/drawingml/2006/main" xmlns:r="http://schemas.openxmlformats.org/officeDocument/2006/relationships" xmlns:p="http://schemas.openxmlformats.org/presentationml/2006/main">
   <p:cSld>
     <p:spTree>
@@ -10888,7 +12406,7 @@
 </p:sld>
 </file>
 
-<file path=ppt/slides/slide13.xml><?xml version="1.0" encoding="utf-8"?>
+<file path=ppt/slides/slide15.xml><?xml version="1.0" encoding="utf-8"?>
 <p:sld xmlns:a="http://schemas.openxmlformats.org/drawingml/2006/main" xmlns:r="http://schemas.openxmlformats.org/officeDocument/2006/relationships" xmlns:p="http://schemas.openxmlformats.org/presentationml/2006/main">
   <p:cSld>
     <p:spTree>
@@ -11224,7 +12742,7 @@
 </p:sld>
 </file>
 
-<file path=ppt/slides/slide14.xml><?xml version="1.0" encoding="utf-8"?>
+<file path=ppt/slides/slide16.xml><?xml version="1.0" encoding="utf-8"?>
 <p:sld xmlns:a="http://schemas.openxmlformats.org/drawingml/2006/main" xmlns:r="http://schemas.openxmlformats.org/officeDocument/2006/relationships" xmlns:p="http://schemas.openxmlformats.org/presentationml/2006/main">
   <p:cSld>
     <p:spTree>
@@ -11320,7 +12838,7 @@
 </p:sld>
 </file>
 
-<file path=ppt/slides/slide15.xml><?xml version="1.0" encoding="utf-8"?>
+<file path=ppt/slides/slide17.xml><?xml version="1.0" encoding="utf-8"?>
 <p:sld xmlns:a="http://schemas.openxmlformats.org/drawingml/2006/main" xmlns:r="http://schemas.openxmlformats.org/officeDocument/2006/relationships" xmlns:p="http://schemas.openxmlformats.org/presentationml/2006/main">
   <p:cSld>
     <p:spTree>
@@ -16805,7 +18323,7 @@
 </p:sld>
 </file>
 
-<file path=ppt/slides/slide16.xml><?xml version="1.0" encoding="utf-8"?>
+<file path=ppt/slides/slide18.xml><?xml version="1.0" encoding="utf-8"?>
 <p:sld xmlns:a="http://schemas.openxmlformats.org/drawingml/2006/main" xmlns:r="http://schemas.openxmlformats.org/officeDocument/2006/relationships" xmlns:p="http://schemas.openxmlformats.org/presentationml/2006/main">
   <p:cSld>
     <p:spTree>
@@ -16931,7 +18449,7 @@
 </p:sld>
 </file>
 
-<file path=ppt/slides/slide17.xml><?xml version="1.0" encoding="utf-8"?>
+<file path=ppt/slides/slide19.xml><?xml version="1.0" encoding="utf-8"?>
 <p:sld xmlns:a="http://schemas.openxmlformats.org/drawingml/2006/main" xmlns:r="http://schemas.openxmlformats.org/officeDocument/2006/relationships" xmlns:p="http://schemas.openxmlformats.org/presentationml/2006/main">
   <p:cSld>
     <p:spTree>
@@ -17330,487 +18848,6 @@
     <p:extLst>
       <p:ext uri="{BB962C8B-B14F-4D97-AF65-F5344CB8AC3E}">
         <p14:creationId xmlns:p14="http://schemas.microsoft.com/office/powerpoint/2010/main" val="3979924898"/>
-      </p:ext>
-    </p:extLst>
-  </p:cSld>
-  <p:clrMapOvr>
-    <a:masterClrMapping/>
-  </p:clrMapOvr>
-</p:sld>
-</file>
-
-<file path=ppt/slides/slide18.xml><?xml version="1.0" encoding="utf-8"?>
-<p:sld xmlns:a="http://schemas.openxmlformats.org/drawingml/2006/main" xmlns:r="http://schemas.openxmlformats.org/officeDocument/2006/relationships" xmlns:p="http://schemas.openxmlformats.org/presentationml/2006/main">
-  <p:cSld>
-    <p:spTree>
-      <p:nvGrpSpPr>
-        <p:cNvPr id="1" name=""/>
-        <p:cNvGrpSpPr/>
-        <p:nvPr/>
-      </p:nvGrpSpPr>
-      <p:grpSpPr>
-        <a:xfrm>
-          <a:off x="0" y="0"/>
-          <a:ext cx="0" cy="0"/>
-          <a:chOff x="0" y="0"/>
-          <a:chExt cx="0" cy="0"/>
-        </a:xfrm>
-      </p:grpSpPr>
-      <p:sp>
-        <p:nvSpPr>
-          <p:cNvPr id="2" name="Title 1">
-            <a:extLst>
-              <a:ext uri="{FF2B5EF4-FFF2-40B4-BE49-F238E27FC236}">
-                <a16:creationId xmlns:a16="http://schemas.microsoft.com/office/drawing/2014/main" id="{41D7E1A7-D350-4F2F-AA70-F9458EC2FE2A}"/>
-              </a:ext>
-            </a:extLst>
-          </p:cNvPr>
-          <p:cNvSpPr>
-            <a:spLocks noGrp="1"/>
-          </p:cNvSpPr>
-          <p:nvPr>
-            <p:ph type="title"/>
-          </p:nvPr>
-        </p:nvSpPr>
-        <p:spPr/>
-        <p:txBody>
-          <a:bodyPr/>
-          <a:lstStyle/>
-          <a:p>
-            <a:r>
-              <a:rPr lang="en-US" dirty="0" err="1"/>
-              <a:t>Hipotesis</a:t>
-            </a:r>
-            <a:r>
-              <a:rPr lang="en-US" dirty="0"/>
-              <a:t> dan </a:t>
-            </a:r>
-            <a:r>
-              <a:rPr lang="en-US" dirty="0" err="1"/>
-              <a:t>Tindak</a:t>
-            </a:r>
-            <a:r>
-              <a:rPr lang="en-US" dirty="0"/>
-              <a:t> </a:t>
-            </a:r>
-            <a:r>
-              <a:rPr lang="en-US" dirty="0" err="1"/>
-              <a:t>Lanjut</a:t>
-            </a:r>
-            <a:endParaRPr lang="en-US" dirty="0"/>
-          </a:p>
-        </p:txBody>
-      </p:sp>
-      <p:sp>
-        <p:nvSpPr>
-          <p:cNvPr id="3" name="Content Placeholder 2">
-            <a:extLst>
-              <a:ext uri="{FF2B5EF4-FFF2-40B4-BE49-F238E27FC236}">
-                <a16:creationId xmlns:a16="http://schemas.microsoft.com/office/drawing/2014/main" id="{0A4087B2-1A74-4C52-945F-A38A8571AC5D}"/>
-              </a:ext>
-            </a:extLst>
-          </p:cNvPr>
-          <p:cNvSpPr>
-            <a:spLocks noGrp="1"/>
-          </p:cNvSpPr>
-          <p:nvPr>
-            <p:ph idx="1"/>
-          </p:nvPr>
-        </p:nvSpPr>
-        <p:spPr/>
-        <p:txBody>
-          <a:bodyPr/>
-          <a:lstStyle/>
-          <a:p>
-            <a:r>
-              <a:rPr lang="en-US" dirty="0" err="1"/>
-              <a:t>Karakteristik</a:t>
-            </a:r>
-            <a:r>
-              <a:rPr lang="en-US" dirty="0"/>
-              <a:t> </a:t>
-            </a:r>
-            <a:r>
-              <a:rPr lang="en-US" dirty="0" err="1"/>
-              <a:t>datanya</a:t>
-            </a:r>
-            <a:r>
-              <a:rPr lang="en-US" dirty="0"/>
-              <a:t> </a:t>
-            </a:r>
-            <a:r>
-              <a:rPr lang="en-US" dirty="0" err="1"/>
-              <a:t>seperti</a:t>
-            </a:r>
-            <a:r>
-              <a:rPr lang="en-US" dirty="0"/>
-              <a:t> </a:t>
-            </a:r>
-            <a:r>
-              <a:rPr lang="en-US" dirty="0" err="1"/>
-              <a:t>apa</a:t>
-            </a:r>
-            <a:r>
-              <a:rPr lang="en-US" dirty="0"/>
-              <a:t>?</a:t>
-            </a:r>
-          </a:p>
-          <a:p>
-            <a:pPr lvl="1"/>
-            <a:r>
-              <a:rPr lang="en-US" dirty="0"/>
-              <a:t>Fitur-</a:t>
-            </a:r>
-            <a:r>
-              <a:rPr lang="en-US" dirty="0" err="1"/>
-              <a:t>fiturnya</a:t>
-            </a:r>
-            <a:r>
-              <a:rPr lang="en-US" dirty="0"/>
-              <a:t> </a:t>
-            </a:r>
-            <a:r>
-              <a:rPr lang="en-US" dirty="0" err="1"/>
-              <a:t>seperti</a:t>
-            </a:r>
-            <a:r>
-              <a:rPr lang="en-US" dirty="0"/>
-              <a:t> </a:t>
-            </a:r>
-            <a:r>
-              <a:rPr lang="en-US" dirty="0" err="1"/>
-              <a:t>apa</a:t>
-            </a:r>
-            <a:r>
-              <a:rPr lang="en-US" dirty="0"/>
-              <a:t>? </a:t>
-            </a:r>
-            <a:r>
-              <a:rPr lang="en-US" dirty="0">
-                <a:latin typeface="Calibri" panose="020F0502020204030204" pitchFamily="34" charset="0"/>
-                <a:cs typeface="Calibri" panose="020F0502020204030204" pitchFamily="34" charset="0"/>
-              </a:rPr>
-              <a:t>→ </a:t>
-            </a:r>
-            <a:r>
-              <a:rPr lang="en-US" dirty="0" err="1">
-                <a:latin typeface="Calibri" panose="020F0502020204030204" pitchFamily="34" charset="0"/>
-                <a:cs typeface="Calibri" panose="020F0502020204030204" pitchFamily="34" charset="0"/>
-              </a:rPr>
-              <a:t>eksplor</a:t>
-            </a:r>
-            <a:r>
-              <a:rPr lang="en-US" dirty="0">
-                <a:latin typeface="Calibri" panose="020F0502020204030204" pitchFamily="34" charset="0"/>
-                <a:cs typeface="Calibri" panose="020F0502020204030204" pitchFamily="34" charset="0"/>
-              </a:rPr>
-              <a:t> &amp; </a:t>
-            </a:r>
-            <a:r>
-              <a:rPr lang="en-US" dirty="0" err="1">
-                <a:latin typeface="Calibri" panose="020F0502020204030204" pitchFamily="34" charset="0"/>
-                <a:cs typeface="Calibri" panose="020F0502020204030204" pitchFamily="34" charset="0"/>
-              </a:rPr>
-              <a:t>lakukan</a:t>
-            </a:r>
-            <a:r>
-              <a:rPr lang="en-US" dirty="0">
-                <a:latin typeface="Calibri" panose="020F0502020204030204" pitchFamily="34" charset="0"/>
-                <a:cs typeface="Calibri" panose="020F0502020204030204" pitchFamily="34" charset="0"/>
-              </a:rPr>
-              <a:t> </a:t>
-            </a:r>
-            <a:r>
-              <a:rPr lang="en-US" i="1" dirty="0">
-                <a:latin typeface="Calibri" panose="020F0502020204030204" pitchFamily="34" charset="0"/>
-                <a:cs typeface="Calibri" panose="020F0502020204030204" pitchFamily="34" charset="0"/>
-              </a:rPr>
-              <a:t>feature extraction</a:t>
-            </a:r>
-          </a:p>
-          <a:p>
-            <a:pPr lvl="1"/>
-            <a:r>
-              <a:rPr lang="en-US" dirty="0">
-                <a:latin typeface="Calibri" panose="020F0502020204030204" pitchFamily="34" charset="0"/>
-                <a:cs typeface="Calibri" panose="020F0502020204030204" pitchFamily="34" charset="0"/>
-              </a:rPr>
-              <a:t>Jika </a:t>
-            </a:r>
-            <a:r>
-              <a:rPr lang="en-US" dirty="0" err="1">
-                <a:latin typeface="Calibri" panose="020F0502020204030204" pitchFamily="34" charset="0"/>
-                <a:cs typeface="Calibri" panose="020F0502020204030204" pitchFamily="34" charset="0"/>
-              </a:rPr>
-              <a:t>dilakukan</a:t>
-            </a:r>
-            <a:r>
-              <a:rPr lang="en-US" dirty="0">
-                <a:latin typeface="Calibri" panose="020F0502020204030204" pitchFamily="34" charset="0"/>
-                <a:cs typeface="Calibri" panose="020F0502020204030204" pitchFamily="34" charset="0"/>
-              </a:rPr>
-              <a:t> clustering, </a:t>
-            </a:r>
-            <a:r>
-              <a:rPr lang="en-US" dirty="0" err="1">
-                <a:latin typeface="Calibri" panose="020F0502020204030204" pitchFamily="34" charset="0"/>
-                <a:cs typeface="Calibri" panose="020F0502020204030204" pitchFamily="34" charset="0"/>
-              </a:rPr>
-              <a:t>apakah</a:t>
-            </a:r>
-            <a:r>
-              <a:rPr lang="en-US" dirty="0">
-                <a:latin typeface="Calibri" panose="020F0502020204030204" pitchFamily="34" charset="0"/>
-                <a:cs typeface="Calibri" panose="020F0502020204030204" pitchFamily="34" charset="0"/>
-              </a:rPr>
-              <a:t> dataset </a:t>
-            </a:r>
-            <a:r>
-              <a:rPr lang="en-US" dirty="0" err="1">
-                <a:latin typeface="Calibri" panose="020F0502020204030204" pitchFamily="34" charset="0"/>
-                <a:cs typeface="Calibri" panose="020F0502020204030204" pitchFamily="34" charset="0"/>
-              </a:rPr>
-              <a:t>dari</a:t>
-            </a:r>
-            <a:r>
-              <a:rPr lang="en-US" dirty="0">
-                <a:latin typeface="Calibri" panose="020F0502020204030204" pitchFamily="34" charset="0"/>
-                <a:cs typeface="Calibri" panose="020F0502020204030204" pitchFamily="34" charset="0"/>
-              </a:rPr>
-              <a:t> </a:t>
-            </a:r>
-            <a:r>
-              <a:rPr lang="en-US" dirty="0" err="1">
-                <a:latin typeface="Calibri" panose="020F0502020204030204" pitchFamily="34" charset="0"/>
-                <a:cs typeface="Calibri" panose="020F0502020204030204" pitchFamily="34" charset="0"/>
-              </a:rPr>
-              <a:t>tiap-tiap</a:t>
-            </a:r>
-            <a:r>
-              <a:rPr lang="en-US" dirty="0">
-                <a:latin typeface="Calibri" panose="020F0502020204030204" pitchFamily="34" charset="0"/>
-                <a:cs typeface="Calibri" panose="020F0502020204030204" pitchFamily="34" charset="0"/>
-              </a:rPr>
-              <a:t> </a:t>
-            </a:r>
-            <a:r>
-              <a:rPr lang="en-US" dirty="0" err="1">
-                <a:latin typeface="Calibri" panose="020F0502020204030204" pitchFamily="34" charset="0"/>
-                <a:cs typeface="Calibri" panose="020F0502020204030204" pitchFamily="34" charset="0"/>
-              </a:rPr>
-              <a:t>kelas</a:t>
-            </a:r>
-            <a:r>
-              <a:rPr lang="en-US" dirty="0">
-                <a:latin typeface="Calibri" panose="020F0502020204030204" pitchFamily="34" charset="0"/>
-                <a:cs typeface="Calibri" panose="020F0502020204030204" pitchFamily="34" charset="0"/>
-              </a:rPr>
-              <a:t> </a:t>
-            </a:r>
-            <a:r>
-              <a:rPr lang="en-US" dirty="0" err="1">
-                <a:latin typeface="Calibri" panose="020F0502020204030204" pitchFamily="34" charset="0"/>
-                <a:cs typeface="Calibri" panose="020F0502020204030204" pitchFamily="34" charset="0"/>
-              </a:rPr>
-              <a:t>memang</a:t>
-            </a:r>
-            <a:r>
-              <a:rPr lang="en-US" dirty="0">
-                <a:latin typeface="Calibri" panose="020F0502020204030204" pitchFamily="34" charset="0"/>
-                <a:cs typeface="Calibri" panose="020F0502020204030204" pitchFamily="34" charset="0"/>
-              </a:rPr>
-              <a:t> </a:t>
-            </a:r>
-            <a:r>
-              <a:rPr lang="en-US" dirty="0" err="1">
-                <a:latin typeface="Calibri" panose="020F0502020204030204" pitchFamily="34" charset="0"/>
-                <a:cs typeface="Calibri" panose="020F0502020204030204" pitchFamily="34" charset="0"/>
-              </a:rPr>
-              <a:t>membentuk</a:t>
-            </a:r>
-            <a:r>
-              <a:rPr lang="en-US" dirty="0">
-                <a:latin typeface="Calibri" panose="020F0502020204030204" pitchFamily="34" charset="0"/>
-                <a:cs typeface="Calibri" panose="020F0502020204030204" pitchFamily="34" charset="0"/>
-              </a:rPr>
-              <a:t> </a:t>
-            </a:r>
-            <a:r>
-              <a:rPr lang="en-US" dirty="0" err="1">
-                <a:latin typeface="Calibri" panose="020F0502020204030204" pitchFamily="34" charset="0"/>
-                <a:cs typeface="Calibri" panose="020F0502020204030204" pitchFamily="34" charset="0"/>
-              </a:rPr>
-              <a:t>tiga</a:t>
-            </a:r>
-            <a:r>
-              <a:rPr lang="en-US" dirty="0">
-                <a:latin typeface="Calibri" panose="020F0502020204030204" pitchFamily="34" charset="0"/>
-                <a:cs typeface="Calibri" panose="020F0502020204030204" pitchFamily="34" charset="0"/>
-              </a:rPr>
-              <a:t> cluster?</a:t>
-            </a:r>
-          </a:p>
-          <a:p>
-            <a:r>
-              <a:rPr lang="en-US" dirty="0">
-                <a:latin typeface="Calibri" panose="020F0502020204030204" pitchFamily="34" charset="0"/>
-                <a:cs typeface="Calibri" panose="020F0502020204030204" pitchFamily="34" charset="0"/>
-              </a:rPr>
-              <a:t>Fine-tuning </a:t>
-            </a:r>
-            <a:r>
-              <a:rPr lang="en-US" dirty="0" err="1">
-                <a:latin typeface="Calibri" panose="020F0502020204030204" pitchFamily="34" charset="0"/>
-                <a:cs typeface="Calibri" panose="020F0502020204030204" pitchFamily="34" charset="0"/>
-              </a:rPr>
-              <a:t>DNABert</a:t>
-            </a:r>
-            <a:r>
-              <a:rPr lang="en-US" dirty="0">
-                <a:latin typeface="Calibri" panose="020F0502020204030204" pitchFamily="34" charset="0"/>
-                <a:cs typeface="Calibri" panose="020F0502020204030204" pitchFamily="34" charset="0"/>
-              </a:rPr>
-              <a:t>?</a:t>
-            </a:r>
-            <a:endParaRPr lang="en-US" dirty="0"/>
-          </a:p>
-        </p:txBody>
-      </p:sp>
-    </p:spTree>
-    <p:extLst>
-      <p:ext uri="{BB962C8B-B14F-4D97-AF65-F5344CB8AC3E}">
-        <p14:creationId xmlns:p14="http://schemas.microsoft.com/office/powerpoint/2010/main" val="306594855"/>
-      </p:ext>
-    </p:extLst>
-  </p:cSld>
-  <p:clrMapOvr>
-    <a:masterClrMapping/>
-  </p:clrMapOvr>
-</p:sld>
-</file>
-
-<file path=ppt/slides/slide19.xml><?xml version="1.0" encoding="utf-8"?>
-<p:sld xmlns:a="http://schemas.openxmlformats.org/drawingml/2006/main" xmlns:r="http://schemas.openxmlformats.org/officeDocument/2006/relationships" xmlns:p="http://schemas.openxmlformats.org/presentationml/2006/main">
-  <p:cSld>
-    <p:spTree>
-      <p:nvGrpSpPr>
-        <p:cNvPr id="1" name=""/>
-        <p:cNvGrpSpPr/>
-        <p:nvPr/>
-      </p:nvGrpSpPr>
-      <p:grpSpPr>
-        <a:xfrm>
-          <a:off x="0" y="0"/>
-          <a:ext cx="0" cy="0"/>
-          <a:chOff x="0" y="0"/>
-          <a:chExt cx="0" cy="0"/>
-        </a:xfrm>
-      </p:grpSpPr>
-      <p:sp>
-        <p:nvSpPr>
-          <p:cNvPr id="2" name="Title 1">
-            <a:extLst>
-              <a:ext uri="{FF2B5EF4-FFF2-40B4-BE49-F238E27FC236}">
-                <a16:creationId xmlns:a16="http://schemas.microsoft.com/office/drawing/2014/main" id="{EAC1FD41-B837-4719-BEFE-C05B5801F9F0}"/>
-              </a:ext>
-            </a:extLst>
-          </p:cNvPr>
-          <p:cNvSpPr>
-            <a:spLocks noGrp="1"/>
-          </p:cNvSpPr>
-          <p:nvPr>
-            <p:ph type="title"/>
-          </p:nvPr>
-        </p:nvSpPr>
-        <p:spPr/>
-        <p:txBody>
-          <a:bodyPr/>
-          <a:lstStyle/>
-          <a:p>
-            <a:r>
-              <a:rPr lang="en-US" dirty="0" err="1"/>
-              <a:t>Referensi</a:t>
-            </a:r>
-            <a:r>
-              <a:rPr lang="en-US" dirty="0"/>
-              <a:t> </a:t>
-            </a:r>
-            <a:r>
-              <a:rPr lang="en-US" dirty="0" err="1"/>
-              <a:t>Tindak</a:t>
-            </a:r>
-            <a:r>
-              <a:rPr lang="en-US" dirty="0"/>
-              <a:t> </a:t>
-            </a:r>
-            <a:r>
-              <a:rPr lang="en-US" dirty="0" err="1"/>
-              <a:t>Lanjut</a:t>
-            </a:r>
-            <a:endParaRPr lang="en-US" dirty="0"/>
-          </a:p>
-        </p:txBody>
-      </p:sp>
-      <p:sp>
-        <p:nvSpPr>
-          <p:cNvPr id="3" name="Content Placeholder 2">
-            <a:extLst>
-              <a:ext uri="{FF2B5EF4-FFF2-40B4-BE49-F238E27FC236}">
-                <a16:creationId xmlns:a16="http://schemas.microsoft.com/office/drawing/2014/main" id="{A78D23AA-20B2-4BF6-9035-24EFFFF0BACB}"/>
-              </a:ext>
-            </a:extLst>
-          </p:cNvPr>
-          <p:cNvSpPr>
-            <a:spLocks noGrp="1"/>
-          </p:cNvSpPr>
-          <p:nvPr>
-            <p:ph idx="1"/>
-          </p:nvPr>
-        </p:nvSpPr>
-        <p:spPr/>
-        <p:txBody>
-          <a:bodyPr/>
-          <a:lstStyle/>
-          <a:p>
-            <a:r>
-              <a:rPr lang="en-US" dirty="0"/>
-              <a:t>Coronavirus genome sequence (</a:t>
-            </a:r>
-            <a:r>
-              <a:rPr lang="en-US" dirty="0">
-                <a:hlinkClick r:id="rId2"/>
-              </a:rPr>
-              <a:t>https://www.kaggle.com/paultimothymooney/coronavirus-genome-sequence/tasks?taskId=490</a:t>
-            </a:r>
-            <a:r>
-              <a:rPr lang="en-US" dirty="0"/>
-              <a:t>)</a:t>
-            </a:r>
-          </a:p>
-          <a:p>
-            <a:pPr lvl="1"/>
-            <a:r>
-              <a:rPr lang="en-US" dirty="0"/>
-              <a:t>Protein identification</a:t>
-            </a:r>
-          </a:p>
-          <a:p>
-            <a:pPr lvl="1"/>
-            <a:r>
-              <a:rPr lang="en-US" dirty="0"/>
-              <a:t>Gene prediction</a:t>
-            </a:r>
-          </a:p>
-          <a:p>
-            <a:pPr lvl="1"/>
-            <a:endParaRPr lang="en-US" dirty="0"/>
-          </a:p>
-        </p:txBody>
-      </p:sp>
-    </p:spTree>
-    <p:extLst>
-      <p:ext uri="{BB962C8B-B14F-4D97-AF65-F5344CB8AC3E}">
-        <p14:creationId xmlns:p14="http://schemas.microsoft.com/office/powerpoint/2010/main" val="366398135"/>
       </p:ext>
     </p:extLst>
   </p:cSld>
@@ -18021,6 +19058,487 @@
 </file>
 
 <file path=ppt/slides/slide20.xml><?xml version="1.0" encoding="utf-8"?>
+<p:sld xmlns:a="http://schemas.openxmlformats.org/drawingml/2006/main" xmlns:r="http://schemas.openxmlformats.org/officeDocument/2006/relationships" xmlns:p="http://schemas.openxmlformats.org/presentationml/2006/main">
+  <p:cSld>
+    <p:spTree>
+      <p:nvGrpSpPr>
+        <p:cNvPr id="1" name=""/>
+        <p:cNvGrpSpPr/>
+        <p:nvPr/>
+      </p:nvGrpSpPr>
+      <p:grpSpPr>
+        <a:xfrm>
+          <a:off x="0" y="0"/>
+          <a:ext cx="0" cy="0"/>
+          <a:chOff x="0" y="0"/>
+          <a:chExt cx="0" cy="0"/>
+        </a:xfrm>
+      </p:grpSpPr>
+      <p:sp>
+        <p:nvSpPr>
+          <p:cNvPr id="2" name="Title 1">
+            <a:extLst>
+              <a:ext uri="{FF2B5EF4-FFF2-40B4-BE49-F238E27FC236}">
+                <a16:creationId xmlns:a16="http://schemas.microsoft.com/office/drawing/2014/main" id="{41D7E1A7-D350-4F2F-AA70-F9458EC2FE2A}"/>
+              </a:ext>
+            </a:extLst>
+          </p:cNvPr>
+          <p:cNvSpPr>
+            <a:spLocks noGrp="1"/>
+          </p:cNvSpPr>
+          <p:nvPr>
+            <p:ph type="title"/>
+          </p:nvPr>
+        </p:nvSpPr>
+        <p:spPr/>
+        <p:txBody>
+          <a:bodyPr/>
+          <a:lstStyle/>
+          <a:p>
+            <a:r>
+              <a:rPr lang="en-US" dirty="0" err="1"/>
+              <a:t>Hipotesis</a:t>
+            </a:r>
+            <a:r>
+              <a:rPr lang="en-US" dirty="0"/>
+              <a:t> dan </a:t>
+            </a:r>
+            <a:r>
+              <a:rPr lang="en-US" dirty="0" err="1"/>
+              <a:t>Tindak</a:t>
+            </a:r>
+            <a:r>
+              <a:rPr lang="en-US" dirty="0"/>
+              <a:t> </a:t>
+            </a:r>
+            <a:r>
+              <a:rPr lang="en-US" dirty="0" err="1"/>
+              <a:t>Lanjut</a:t>
+            </a:r>
+            <a:endParaRPr lang="en-US" dirty="0"/>
+          </a:p>
+        </p:txBody>
+      </p:sp>
+      <p:sp>
+        <p:nvSpPr>
+          <p:cNvPr id="3" name="Content Placeholder 2">
+            <a:extLst>
+              <a:ext uri="{FF2B5EF4-FFF2-40B4-BE49-F238E27FC236}">
+                <a16:creationId xmlns:a16="http://schemas.microsoft.com/office/drawing/2014/main" id="{0A4087B2-1A74-4C52-945F-A38A8571AC5D}"/>
+              </a:ext>
+            </a:extLst>
+          </p:cNvPr>
+          <p:cNvSpPr>
+            <a:spLocks noGrp="1"/>
+          </p:cNvSpPr>
+          <p:nvPr>
+            <p:ph idx="1"/>
+          </p:nvPr>
+        </p:nvSpPr>
+        <p:spPr/>
+        <p:txBody>
+          <a:bodyPr/>
+          <a:lstStyle/>
+          <a:p>
+            <a:r>
+              <a:rPr lang="en-US" dirty="0" err="1"/>
+              <a:t>Karakteristik</a:t>
+            </a:r>
+            <a:r>
+              <a:rPr lang="en-US" dirty="0"/>
+              <a:t> </a:t>
+            </a:r>
+            <a:r>
+              <a:rPr lang="en-US" dirty="0" err="1"/>
+              <a:t>datanya</a:t>
+            </a:r>
+            <a:r>
+              <a:rPr lang="en-US" dirty="0"/>
+              <a:t> </a:t>
+            </a:r>
+            <a:r>
+              <a:rPr lang="en-US" dirty="0" err="1"/>
+              <a:t>seperti</a:t>
+            </a:r>
+            <a:r>
+              <a:rPr lang="en-US" dirty="0"/>
+              <a:t> </a:t>
+            </a:r>
+            <a:r>
+              <a:rPr lang="en-US" dirty="0" err="1"/>
+              <a:t>apa</a:t>
+            </a:r>
+            <a:r>
+              <a:rPr lang="en-US" dirty="0"/>
+              <a:t>?</a:t>
+            </a:r>
+          </a:p>
+          <a:p>
+            <a:pPr lvl="1"/>
+            <a:r>
+              <a:rPr lang="en-US" dirty="0"/>
+              <a:t>Fitur-</a:t>
+            </a:r>
+            <a:r>
+              <a:rPr lang="en-US" dirty="0" err="1"/>
+              <a:t>fiturnya</a:t>
+            </a:r>
+            <a:r>
+              <a:rPr lang="en-US" dirty="0"/>
+              <a:t> </a:t>
+            </a:r>
+            <a:r>
+              <a:rPr lang="en-US" dirty="0" err="1"/>
+              <a:t>seperti</a:t>
+            </a:r>
+            <a:r>
+              <a:rPr lang="en-US" dirty="0"/>
+              <a:t> </a:t>
+            </a:r>
+            <a:r>
+              <a:rPr lang="en-US" dirty="0" err="1"/>
+              <a:t>apa</a:t>
+            </a:r>
+            <a:r>
+              <a:rPr lang="en-US" dirty="0"/>
+              <a:t>? </a:t>
+            </a:r>
+            <a:r>
+              <a:rPr lang="en-US" dirty="0">
+                <a:latin typeface="Calibri" panose="020F0502020204030204" pitchFamily="34" charset="0"/>
+                <a:cs typeface="Calibri" panose="020F0502020204030204" pitchFamily="34" charset="0"/>
+              </a:rPr>
+              <a:t>→ </a:t>
+            </a:r>
+            <a:r>
+              <a:rPr lang="en-US" dirty="0" err="1">
+                <a:latin typeface="Calibri" panose="020F0502020204030204" pitchFamily="34" charset="0"/>
+                <a:cs typeface="Calibri" panose="020F0502020204030204" pitchFamily="34" charset="0"/>
+              </a:rPr>
+              <a:t>eksplor</a:t>
+            </a:r>
+            <a:r>
+              <a:rPr lang="en-US" dirty="0">
+                <a:latin typeface="Calibri" panose="020F0502020204030204" pitchFamily="34" charset="0"/>
+                <a:cs typeface="Calibri" panose="020F0502020204030204" pitchFamily="34" charset="0"/>
+              </a:rPr>
+              <a:t> &amp; </a:t>
+            </a:r>
+            <a:r>
+              <a:rPr lang="en-US" dirty="0" err="1">
+                <a:latin typeface="Calibri" panose="020F0502020204030204" pitchFamily="34" charset="0"/>
+                <a:cs typeface="Calibri" panose="020F0502020204030204" pitchFamily="34" charset="0"/>
+              </a:rPr>
+              <a:t>lakukan</a:t>
+            </a:r>
+            <a:r>
+              <a:rPr lang="en-US" dirty="0">
+                <a:latin typeface="Calibri" panose="020F0502020204030204" pitchFamily="34" charset="0"/>
+                <a:cs typeface="Calibri" panose="020F0502020204030204" pitchFamily="34" charset="0"/>
+              </a:rPr>
+              <a:t> </a:t>
+            </a:r>
+            <a:r>
+              <a:rPr lang="en-US" i="1" dirty="0">
+                <a:latin typeface="Calibri" panose="020F0502020204030204" pitchFamily="34" charset="0"/>
+                <a:cs typeface="Calibri" panose="020F0502020204030204" pitchFamily="34" charset="0"/>
+              </a:rPr>
+              <a:t>feature extraction</a:t>
+            </a:r>
+          </a:p>
+          <a:p>
+            <a:pPr lvl="1"/>
+            <a:r>
+              <a:rPr lang="en-US" dirty="0">
+                <a:latin typeface="Calibri" panose="020F0502020204030204" pitchFamily="34" charset="0"/>
+                <a:cs typeface="Calibri" panose="020F0502020204030204" pitchFamily="34" charset="0"/>
+              </a:rPr>
+              <a:t>Jika </a:t>
+            </a:r>
+            <a:r>
+              <a:rPr lang="en-US" dirty="0" err="1">
+                <a:latin typeface="Calibri" panose="020F0502020204030204" pitchFamily="34" charset="0"/>
+                <a:cs typeface="Calibri" panose="020F0502020204030204" pitchFamily="34" charset="0"/>
+              </a:rPr>
+              <a:t>dilakukan</a:t>
+            </a:r>
+            <a:r>
+              <a:rPr lang="en-US" dirty="0">
+                <a:latin typeface="Calibri" panose="020F0502020204030204" pitchFamily="34" charset="0"/>
+                <a:cs typeface="Calibri" panose="020F0502020204030204" pitchFamily="34" charset="0"/>
+              </a:rPr>
+              <a:t> clustering, </a:t>
+            </a:r>
+            <a:r>
+              <a:rPr lang="en-US" dirty="0" err="1">
+                <a:latin typeface="Calibri" panose="020F0502020204030204" pitchFamily="34" charset="0"/>
+                <a:cs typeface="Calibri" panose="020F0502020204030204" pitchFamily="34" charset="0"/>
+              </a:rPr>
+              <a:t>apakah</a:t>
+            </a:r>
+            <a:r>
+              <a:rPr lang="en-US" dirty="0">
+                <a:latin typeface="Calibri" panose="020F0502020204030204" pitchFamily="34" charset="0"/>
+                <a:cs typeface="Calibri" panose="020F0502020204030204" pitchFamily="34" charset="0"/>
+              </a:rPr>
+              <a:t> dataset </a:t>
+            </a:r>
+            <a:r>
+              <a:rPr lang="en-US" dirty="0" err="1">
+                <a:latin typeface="Calibri" panose="020F0502020204030204" pitchFamily="34" charset="0"/>
+                <a:cs typeface="Calibri" panose="020F0502020204030204" pitchFamily="34" charset="0"/>
+              </a:rPr>
+              <a:t>dari</a:t>
+            </a:r>
+            <a:r>
+              <a:rPr lang="en-US" dirty="0">
+                <a:latin typeface="Calibri" panose="020F0502020204030204" pitchFamily="34" charset="0"/>
+                <a:cs typeface="Calibri" panose="020F0502020204030204" pitchFamily="34" charset="0"/>
+              </a:rPr>
+              <a:t> </a:t>
+            </a:r>
+            <a:r>
+              <a:rPr lang="en-US" dirty="0" err="1">
+                <a:latin typeface="Calibri" panose="020F0502020204030204" pitchFamily="34" charset="0"/>
+                <a:cs typeface="Calibri" panose="020F0502020204030204" pitchFamily="34" charset="0"/>
+              </a:rPr>
+              <a:t>tiap-tiap</a:t>
+            </a:r>
+            <a:r>
+              <a:rPr lang="en-US" dirty="0">
+                <a:latin typeface="Calibri" panose="020F0502020204030204" pitchFamily="34" charset="0"/>
+                <a:cs typeface="Calibri" panose="020F0502020204030204" pitchFamily="34" charset="0"/>
+              </a:rPr>
+              <a:t> </a:t>
+            </a:r>
+            <a:r>
+              <a:rPr lang="en-US" dirty="0" err="1">
+                <a:latin typeface="Calibri" panose="020F0502020204030204" pitchFamily="34" charset="0"/>
+                <a:cs typeface="Calibri" panose="020F0502020204030204" pitchFamily="34" charset="0"/>
+              </a:rPr>
+              <a:t>kelas</a:t>
+            </a:r>
+            <a:r>
+              <a:rPr lang="en-US" dirty="0">
+                <a:latin typeface="Calibri" panose="020F0502020204030204" pitchFamily="34" charset="0"/>
+                <a:cs typeface="Calibri" panose="020F0502020204030204" pitchFamily="34" charset="0"/>
+              </a:rPr>
+              <a:t> </a:t>
+            </a:r>
+            <a:r>
+              <a:rPr lang="en-US" dirty="0" err="1">
+                <a:latin typeface="Calibri" panose="020F0502020204030204" pitchFamily="34" charset="0"/>
+                <a:cs typeface="Calibri" panose="020F0502020204030204" pitchFamily="34" charset="0"/>
+              </a:rPr>
+              <a:t>memang</a:t>
+            </a:r>
+            <a:r>
+              <a:rPr lang="en-US" dirty="0">
+                <a:latin typeface="Calibri" panose="020F0502020204030204" pitchFamily="34" charset="0"/>
+                <a:cs typeface="Calibri" panose="020F0502020204030204" pitchFamily="34" charset="0"/>
+              </a:rPr>
+              <a:t> </a:t>
+            </a:r>
+            <a:r>
+              <a:rPr lang="en-US" dirty="0" err="1">
+                <a:latin typeface="Calibri" panose="020F0502020204030204" pitchFamily="34" charset="0"/>
+                <a:cs typeface="Calibri" panose="020F0502020204030204" pitchFamily="34" charset="0"/>
+              </a:rPr>
+              <a:t>membentuk</a:t>
+            </a:r>
+            <a:r>
+              <a:rPr lang="en-US" dirty="0">
+                <a:latin typeface="Calibri" panose="020F0502020204030204" pitchFamily="34" charset="0"/>
+                <a:cs typeface="Calibri" panose="020F0502020204030204" pitchFamily="34" charset="0"/>
+              </a:rPr>
+              <a:t> </a:t>
+            </a:r>
+            <a:r>
+              <a:rPr lang="en-US" dirty="0" err="1">
+                <a:latin typeface="Calibri" panose="020F0502020204030204" pitchFamily="34" charset="0"/>
+                <a:cs typeface="Calibri" panose="020F0502020204030204" pitchFamily="34" charset="0"/>
+              </a:rPr>
+              <a:t>tiga</a:t>
+            </a:r>
+            <a:r>
+              <a:rPr lang="en-US" dirty="0">
+                <a:latin typeface="Calibri" panose="020F0502020204030204" pitchFamily="34" charset="0"/>
+                <a:cs typeface="Calibri" panose="020F0502020204030204" pitchFamily="34" charset="0"/>
+              </a:rPr>
+              <a:t> cluster?</a:t>
+            </a:r>
+          </a:p>
+          <a:p>
+            <a:r>
+              <a:rPr lang="en-US" dirty="0">
+                <a:latin typeface="Calibri" panose="020F0502020204030204" pitchFamily="34" charset="0"/>
+                <a:cs typeface="Calibri" panose="020F0502020204030204" pitchFamily="34" charset="0"/>
+              </a:rPr>
+              <a:t>Fine-tuning </a:t>
+            </a:r>
+            <a:r>
+              <a:rPr lang="en-US" dirty="0" err="1">
+                <a:latin typeface="Calibri" panose="020F0502020204030204" pitchFamily="34" charset="0"/>
+                <a:cs typeface="Calibri" panose="020F0502020204030204" pitchFamily="34" charset="0"/>
+              </a:rPr>
+              <a:t>DNABert</a:t>
+            </a:r>
+            <a:r>
+              <a:rPr lang="en-US" dirty="0">
+                <a:latin typeface="Calibri" panose="020F0502020204030204" pitchFamily="34" charset="0"/>
+                <a:cs typeface="Calibri" panose="020F0502020204030204" pitchFamily="34" charset="0"/>
+              </a:rPr>
+              <a:t>?</a:t>
+            </a:r>
+            <a:endParaRPr lang="en-US" dirty="0"/>
+          </a:p>
+        </p:txBody>
+      </p:sp>
+    </p:spTree>
+    <p:extLst>
+      <p:ext uri="{BB962C8B-B14F-4D97-AF65-F5344CB8AC3E}">
+        <p14:creationId xmlns:p14="http://schemas.microsoft.com/office/powerpoint/2010/main" val="306594855"/>
+      </p:ext>
+    </p:extLst>
+  </p:cSld>
+  <p:clrMapOvr>
+    <a:masterClrMapping/>
+  </p:clrMapOvr>
+</p:sld>
+</file>
+
+<file path=ppt/slides/slide21.xml><?xml version="1.0" encoding="utf-8"?>
+<p:sld xmlns:a="http://schemas.openxmlformats.org/drawingml/2006/main" xmlns:r="http://schemas.openxmlformats.org/officeDocument/2006/relationships" xmlns:p="http://schemas.openxmlformats.org/presentationml/2006/main">
+  <p:cSld>
+    <p:spTree>
+      <p:nvGrpSpPr>
+        <p:cNvPr id="1" name=""/>
+        <p:cNvGrpSpPr/>
+        <p:nvPr/>
+      </p:nvGrpSpPr>
+      <p:grpSpPr>
+        <a:xfrm>
+          <a:off x="0" y="0"/>
+          <a:ext cx="0" cy="0"/>
+          <a:chOff x="0" y="0"/>
+          <a:chExt cx="0" cy="0"/>
+        </a:xfrm>
+      </p:grpSpPr>
+      <p:sp>
+        <p:nvSpPr>
+          <p:cNvPr id="2" name="Title 1">
+            <a:extLst>
+              <a:ext uri="{FF2B5EF4-FFF2-40B4-BE49-F238E27FC236}">
+                <a16:creationId xmlns:a16="http://schemas.microsoft.com/office/drawing/2014/main" id="{EAC1FD41-B837-4719-BEFE-C05B5801F9F0}"/>
+              </a:ext>
+            </a:extLst>
+          </p:cNvPr>
+          <p:cNvSpPr>
+            <a:spLocks noGrp="1"/>
+          </p:cNvSpPr>
+          <p:nvPr>
+            <p:ph type="title"/>
+          </p:nvPr>
+        </p:nvSpPr>
+        <p:spPr/>
+        <p:txBody>
+          <a:bodyPr/>
+          <a:lstStyle/>
+          <a:p>
+            <a:r>
+              <a:rPr lang="en-US" dirty="0" err="1"/>
+              <a:t>Referensi</a:t>
+            </a:r>
+            <a:r>
+              <a:rPr lang="en-US" dirty="0"/>
+              <a:t> </a:t>
+            </a:r>
+            <a:r>
+              <a:rPr lang="en-US" dirty="0" err="1"/>
+              <a:t>Tindak</a:t>
+            </a:r>
+            <a:r>
+              <a:rPr lang="en-US" dirty="0"/>
+              <a:t> </a:t>
+            </a:r>
+            <a:r>
+              <a:rPr lang="en-US" dirty="0" err="1"/>
+              <a:t>Lanjut</a:t>
+            </a:r>
+            <a:endParaRPr lang="en-US" dirty="0"/>
+          </a:p>
+        </p:txBody>
+      </p:sp>
+      <p:sp>
+        <p:nvSpPr>
+          <p:cNvPr id="3" name="Content Placeholder 2">
+            <a:extLst>
+              <a:ext uri="{FF2B5EF4-FFF2-40B4-BE49-F238E27FC236}">
+                <a16:creationId xmlns:a16="http://schemas.microsoft.com/office/drawing/2014/main" id="{A78D23AA-20B2-4BF6-9035-24EFFFF0BACB}"/>
+              </a:ext>
+            </a:extLst>
+          </p:cNvPr>
+          <p:cNvSpPr>
+            <a:spLocks noGrp="1"/>
+          </p:cNvSpPr>
+          <p:nvPr>
+            <p:ph idx="1"/>
+          </p:nvPr>
+        </p:nvSpPr>
+        <p:spPr/>
+        <p:txBody>
+          <a:bodyPr/>
+          <a:lstStyle/>
+          <a:p>
+            <a:r>
+              <a:rPr lang="en-US" dirty="0"/>
+              <a:t>Coronavirus genome sequence (</a:t>
+            </a:r>
+            <a:r>
+              <a:rPr lang="en-US" dirty="0">
+                <a:hlinkClick r:id="rId2"/>
+              </a:rPr>
+              <a:t>https://www.kaggle.com/paultimothymooney/coronavirus-genome-sequence/tasks?taskId=490</a:t>
+            </a:r>
+            <a:r>
+              <a:rPr lang="en-US" dirty="0"/>
+              <a:t>)</a:t>
+            </a:r>
+          </a:p>
+          <a:p>
+            <a:pPr lvl="1"/>
+            <a:r>
+              <a:rPr lang="en-US" dirty="0"/>
+              <a:t>Protein identification</a:t>
+            </a:r>
+          </a:p>
+          <a:p>
+            <a:pPr lvl="1"/>
+            <a:r>
+              <a:rPr lang="en-US" dirty="0"/>
+              <a:t>Gene prediction</a:t>
+            </a:r>
+          </a:p>
+          <a:p>
+            <a:pPr lvl="1"/>
+            <a:endParaRPr lang="en-US" dirty="0"/>
+          </a:p>
+        </p:txBody>
+      </p:sp>
+    </p:spTree>
+    <p:extLst>
+      <p:ext uri="{BB962C8B-B14F-4D97-AF65-F5344CB8AC3E}">
+        <p14:creationId xmlns:p14="http://schemas.microsoft.com/office/powerpoint/2010/main" val="366398135"/>
+      </p:ext>
+    </p:extLst>
+  </p:cSld>
+  <p:clrMapOvr>
+    <a:masterClrMapping/>
+  </p:clrMapOvr>
+</p:sld>
+</file>
+
+<file path=ppt/slides/slide22.xml><?xml version="1.0" encoding="utf-8"?>
 <p:sld xmlns:a="http://schemas.openxmlformats.org/drawingml/2006/main" xmlns:r="http://schemas.openxmlformats.org/officeDocument/2006/relationships" xmlns:p="http://schemas.openxmlformats.org/presentationml/2006/main">
   <p:cSld>
     <p:spTree>
@@ -18598,7 +20116,7 @@
 </p:sld>
 </file>
 
-<file path=ppt/slides/slide21.xml><?xml version="1.0" encoding="utf-8"?>
+<file path=ppt/slides/slide23.xml><?xml version="1.0" encoding="utf-8"?>
 <p:sld xmlns:a="http://schemas.openxmlformats.org/drawingml/2006/main" xmlns:r="http://schemas.openxmlformats.org/officeDocument/2006/relationships" xmlns:p="http://schemas.openxmlformats.org/presentationml/2006/main">
   <p:cSld>
     <p:spTree>
@@ -18776,7 +20294,7 @@
 </p:sld>
 </file>
 
-<file path=ppt/slides/slide22.xml><?xml version="1.0" encoding="utf-8"?>
+<file path=ppt/slides/slide24.xml><?xml version="1.0" encoding="utf-8"?>
 <p:sld xmlns:a="http://schemas.openxmlformats.org/drawingml/2006/main" xmlns:r="http://schemas.openxmlformats.org/officeDocument/2006/relationships" xmlns:p="http://schemas.openxmlformats.org/presentationml/2006/main">
   <p:cSld>
     <p:spTree>
@@ -18970,7 +20488,7 @@
 </p:sld>
 </file>
 
-<file path=ppt/slides/slide23.xml><?xml version="1.0" encoding="utf-8"?>
+<file path=ppt/slides/slide25.xml><?xml version="1.0" encoding="utf-8"?>
 <p:sld xmlns:a="http://schemas.openxmlformats.org/drawingml/2006/main" xmlns:r="http://schemas.openxmlformats.org/officeDocument/2006/relationships" xmlns:p="http://schemas.openxmlformats.org/presentationml/2006/main">
   <p:cSld>
     <p:spTree>
@@ -19175,7 +20693,7 @@
 </p:sld>
 </file>
 
-<file path=ppt/slides/slide24.xml><?xml version="1.0" encoding="utf-8"?>
+<file path=ppt/slides/slide26.xml><?xml version="1.0" encoding="utf-8"?>
 <p:sld xmlns:a="http://schemas.openxmlformats.org/drawingml/2006/main" xmlns:r="http://schemas.openxmlformats.org/officeDocument/2006/relationships" xmlns:p="http://schemas.openxmlformats.org/presentationml/2006/main">
   <p:cSld>
     <p:spTree>
@@ -19669,6 +21187,95 @@
 </file>
 
 <file path=ppt/slides/slide3.xml><?xml version="1.0" encoding="utf-8"?>
+<p:sld xmlns:a="http://schemas.openxmlformats.org/drawingml/2006/main" xmlns:r="http://schemas.openxmlformats.org/officeDocument/2006/relationships" xmlns:p="http://schemas.openxmlformats.org/presentationml/2006/main">
+  <p:cSld>
+    <p:spTree>
+      <p:nvGrpSpPr>
+        <p:cNvPr id="1" name=""/>
+        <p:cNvGrpSpPr/>
+        <p:nvPr/>
+      </p:nvGrpSpPr>
+      <p:grpSpPr>
+        <a:xfrm>
+          <a:off x="0" y="0"/>
+          <a:ext cx="0" cy="0"/>
+          <a:chOff x="0" y="0"/>
+          <a:chExt cx="0" cy="0"/>
+        </a:xfrm>
+      </p:grpSpPr>
+      <p:sp>
+        <p:nvSpPr>
+          <p:cNvPr id="2" name="Title 1">
+            <a:extLst>
+              <a:ext uri="{FF2B5EF4-FFF2-40B4-BE49-F238E27FC236}">
+                <a16:creationId xmlns:a16="http://schemas.microsoft.com/office/drawing/2014/main" id="{FA46E6A8-E355-421E-80C1-D898886F686E}"/>
+              </a:ext>
+            </a:extLst>
+          </p:cNvPr>
+          <p:cNvSpPr>
+            <a:spLocks noGrp="1"/>
+          </p:cNvSpPr>
+          <p:nvPr>
+            <p:ph type="title"/>
+          </p:nvPr>
+        </p:nvSpPr>
+        <p:spPr/>
+        <p:txBody>
+          <a:bodyPr/>
+          <a:lstStyle/>
+          <a:p>
+            <a:r>
+              <a:rPr lang="en-US" dirty="0"/>
+              <a:t>Hasil </a:t>
+            </a:r>
+            <a:r>
+              <a:rPr lang="en-US" dirty="0" err="1"/>
+              <a:t>Eksperimen</a:t>
+            </a:r>
+            <a:endParaRPr lang="en-ID" dirty="0"/>
+          </a:p>
+        </p:txBody>
+      </p:sp>
+      <p:graphicFrame>
+        <p:nvGraphicFramePr>
+          <p:cNvPr id="4" name="Content Placeholder 3">
+            <a:extLst>
+              <a:ext uri="{FF2B5EF4-FFF2-40B4-BE49-F238E27FC236}">
+                <a16:creationId xmlns:a16="http://schemas.microsoft.com/office/drawing/2014/main" id="{3703D3B0-4CA2-44E3-9392-DC9AA0907D31}"/>
+              </a:ext>
+            </a:extLst>
+          </p:cNvPr>
+          <p:cNvGraphicFramePr>
+            <a:graphicFrameLocks noGrp="1"/>
+          </p:cNvGraphicFramePr>
+          <p:nvPr>
+            <p:ph idx="1"/>
+          </p:nvPr>
+        </p:nvGraphicFramePr>
+        <p:xfrm>
+          <a:off x="838200" y="1825625"/>
+          <a:ext cx="10515600" cy="4351338"/>
+        </p:xfrm>
+        <a:graphic>
+          <a:graphicData uri="http://schemas.openxmlformats.org/drawingml/2006/chart">
+            <c:chart xmlns:c="http://schemas.openxmlformats.org/drawingml/2006/chart" xmlns:r="http://schemas.openxmlformats.org/officeDocument/2006/relationships" r:id="rId2"/>
+          </a:graphicData>
+        </a:graphic>
+      </p:graphicFrame>
+    </p:spTree>
+    <p:extLst>
+      <p:ext uri="{BB962C8B-B14F-4D97-AF65-F5344CB8AC3E}">
+        <p14:creationId xmlns:p14="http://schemas.microsoft.com/office/powerpoint/2010/main" val="4010133688"/>
+      </p:ext>
+    </p:extLst>
+  </p:cSld>
+  <p:clrMapOvr>
+    <a:masterClrMapping/>
+  </p:clrMapOvr>
+</p:sld>
+</file>
+
+<file path=ppt/slides/slide4.xml><?xml version="1.0" encoding="utf-8"?>
 <p:sld xmlns:a="http://schemas.openxmlformats.org/drawingml/2006/main" xmlns:r="http://schemas.openxmlformats.org/officeDocument/2006/relationships" xmlns:p="http://schemas.openxmlformats.org/presentationml/2006/main">
   <p:cSld>
     <p:spTree>
@@ -20355,7 +21962,710 @@
 </p:sld>
 </file>
 
-<file path=ppt/slides/slide4.xml><?xml version="1.0" encoding="utf-8"?>
+<file path=ppt/slides/slide5.xml><?xml version="1.0" encoding="utf-8"?>
+<p:sld xmlns:a="http://schemas.openxmlformats.org/drawingml/2006/main" xmlns:r="http://schemas.openxmlformats.org/officeDocument/2006/relationships" xmlns:p="http://schemas.openxmlformats.org/presentationml/2006/main">
+  <p:cSld>
+    <p:spTree>
+      <p:nvGrpSpPr>
+        <p:cNvPr id="1" name=""/>
+        <p:cNvGrpSpPr/>
+        <p:nvPr/>
+      </p:nvGrpSpPr>
+      <p:grpSpPr>
+        <a:xfrm>
+          <a:off x="0" y="0"/>
+          <a:ext cx="0" cy="0"/>
+          <a:chOff x="0" y="0"/>
+          <a:chExt cx="0" cy="0"/>
+        </a:xfrm>
+      </p:grpSpPr>
+      <p:sp>
+        <p:nvSpPr>
+          <p:cNvPr id="2" name="Title 1">
+            <a:extLst>
+              <a:ext uri="{FF2B5EF4-FFF2-40B4-BE49-F238E27FC236}">
+                <a16:creationId xmlns:a16="http://schemas.microsoft.com/office/drawing/2014/main" id="{35AAB79D-2AD0-4CF0-9B53-47E9E20B3122}"/>
+              </a:ext>
+            </a:extLst>
+          </p:cNvPr>
+          <p:cNvSpPr>
+            <a:spLocks noGrp="1"/>
+          </p:cNvSpPr>
+          <p:nvPr>
+            <p:ph type="title"/>
+          </p:nvPr>
+        </p:nvSpPr>
+        <p:spPr/>
+        <p:txBody>
+          <a:bodyPr/>
+          <a:lstStyle/>
+          <a:p>
+            <a:r>
+              <a:rPr lang="en-US" dirty="0" err="1"/>
+              <a:t>Eksperimen</a:t>
+            </a:r>
+            <a:r>
+              <a:rPr lang="en-US" dirty="0"/>
+              <a:t> &amp; Hasil</a:t>
+            </a:r>
+            <a:endParaRPr lang="en-ID" dirty="0"/>
+          </a:p>
+        </p:txBody>
+      </p:sp>
+      <p:sp>
+        <p:nvSpPr>
+          <p:cNvPr id="3" name="Content Placeholder 2">
+            <a:extLst>
+              <a:ext uri="{FF2B5EF4-FFF2-40B4-BE49-F238E27FC236}">
+                <a16:creationId xmlns:a16="http://schemas.microsoft.com/office/drawing/2014/main" id="{26DF05B1-74F0-4115-AAF0-674402E02288}"/>
+              </a:ext>
+            </a:extLst>
+          </p:cNvPr>
+          <p:cNvSpPr>
+            <a:spLocks noGrp="1"/>
+          </p:cNvSpPr>
+          <p:nvPr>
+            <p:ph idx="1"/>
+          </p:nvPr>
+        </p:nvSpPr>
+        <p:spPr>
+          <a:xfrm>
+            <a:off x="838200" y="1825625"/>
+            <a:ext cx="10515600" cy="1603375"/>
+          </a:xfrm>
+        </p:spPr>
+        <p:txBody>
+          <a:bodyPr/>
+          <a:lstStyle/>
+          <a:p>
+            <a:r>
+              <a:rPr lang="en-US" dirty="0"/>
+              <a:t>300 instance </a:t>
+            </a:r>
+            <a:r>
+              <a:rPr lang="en-US" dirty="0" err="1"/>
+              <a:t>macaca</a:t>
+            </a:r>
+            <a:r>
+              <a:rPr lang="en-US" dirty="0"/>
+              <a:t> TATA promoter</a:t>
+            </a:r>
+          </a:p>
+          <a:p>
+            <a:r>
+              <a:rPr lang="en-US" dirty="0"/>
+              <a:t>300 instance </a:t>
+            </a:r>
+            <a:r>
+              <a:rPr lang="en-US" dirty="0" err="1"/>
+              <a:t>macaca</a:t>
+            </a:r>
+            <a:r>
+              <a:rPr lang="en-US" dirty="0"/>
+              <a:t> non TATA promoter</a:t>
+            </a:r>
+          </a:p>
+          <a:p>
+            <a:r>
+              <a:rPr lang="en-US" dirty="0"/>
+              <a:t>Model human TATA promoter &amp; human non TATA promoter</a:t>
+            </a:r>
+            <a:endParaRPr lang="en-ID" dirty="0"/>
+          </a:p>
+        </p:txBody>
+      </p:sp>
+      <p:graphicFrame>
+        <p:nvGraphicFramePr>
+          <p:cNvPr id="4" name="Table 4">
+            <a:extLst>
+              <a:ext uri="{FF2B5EF4-FFF2-40B4-BE49-F238E27FC236}">
+                <a16:creationId xmlns:a16="http://schemas.microsoft.com/office/drawing/2014/main" id="{0E03B3F1-3F47-4E44-95C2-86227CC5B593}"/>
+              </a:ext>
+            </a:extLst>
+          </p:cNvPr>
+          <p:cNvGraphicFramePr>
+            <a:graphicFrameLocks noGrp="1"/>
+          </p:cNvGraphicFramePr>
+          <p:nvPr>
+            <p:extLst>
+              <p:ext uri="{D42A27DB-BD31-4B8C-83A1-F6EECF244321}">
+                <p14:modId xmlns:p14="http://schemas.microsoft.com/office/powerpoint/2010/main" val="1041096984"/>
+              </p:ext>
+            </p:extLst>
+          </p:nvPr>
+        </p:nvGraphicFramePr>
+        <p:xfrm>
+          <a:off x="838199" y="3563937"/>
+          <a:ext cx="10515600" cy="1483360"/>
+        </p:xfrm>
+        <a:graphic>
+          <a:graphicData uri="http://schemas.openxmlformats.org/drawingml/2006/table">
+            <a:tbl>
+              <a:tblPr firstRow="1" bandRow="1">
+                <a:tableStyleId>{073A0DAA-6AF3-43AB-8588-CEC1D06C72B9}</a:tableStyleId>
+              </a:tblPr>
+              <a:tblGrid>
+                <a:gridCol w="2590801">
+                  <a:extLst>
+                    <a:ext uri="{9D8B030D-6E8A-4147-A177-3AD203B41FA5}">
+                      <a16:colId xmlns:a16="http://schemas.microsoft.com/office/drawing/2014/main" val="731001651"/>
+                    </a:ext>
+                  </a:extLst>
+                </a:gridCol>
+                <a:gridCol w="1615439">
+                  <a:extLst>
+                    <a:ext uri="{9D8B030D-6E8A-4147-A177-3AD203B41FA5}">
+                      <a16:colId xmlns:a16="http://schemas.microsoft.com/office/drawing/2014/main" val="2252878231"/>
+                    </a:ext>
+                  </a:extLst>
+                </a:gridCol>
+                <a:gridCol w="2103120">
+                  <a:extLst>
+                    <a:ext uri="{9D8B030D-6E8A-4147-A177-3AD203B41FA5}">
+                      <a16:colId xmlns:a16="http://schemas.microsoft.com/office/drawing/2014/main" val="113156282"/>
+                    </a:ext>
+                  </a:extLst>
+                </a:gridCol>
+                <a:gridCol w="2103120">
+                  <a:extLst>
+                    <a:ext uri="{9D8B030D-6E8A-4147-A177-3AD203B41FA5}">
+                      <a16:colId xmlns:a16="http://schemas.microsoft.com/office/drawing/2014/main" val="2852915454"/>
+                    </a:ext>
+                  </a:extLst>
+                </a:gridCol>
+                <a:gridCol w="2103120">
+                  <a:extLst>
+                    <a:ext uri="{9D8B030D-6E8A-4147-A177-3AD203B41FA5}">
+                      <a16:colId xmlns:a16="http://schemas.microsoft.com/office/drawing/2014/main" val="3439518816"/>
+                    </a:ext>
+                  </a:extLst>
+                </a:gridCol>
+              </a:tblGrid>
+              <a:tr h="370840">
+                <a:tc rowSpan="2">
+                  <a:txBody>
+                    <a:bodyPr/>
+                    <a:lstStyle/>
+                    <a:p>
+                      <a:pPr algn="ctr"/>
+                      <a:r>
+                        <a:rPr lang="en-US" dirty="0"/>
+                        <a:t>Data </a:t>
+                      </a:r>
+                      <a:r>
+                        <a:rPr lang="en-US" dirty="0" err="1"/>
+                        <a:t>Tes</a:t>
+                      </a:r>
+                      <a:endParaRPr lang="en-ID" dirty="0"/>
+                    </a:p>
+                  </a:txBody>
+                  <a:tcPr anchor="ctr"/>
+                </a:tc>
+                <a:tc gridSpan="2">
+                  <a:txBody>
+                    <a:bodyPr/>
+                    <a:lstStyle/>
+                    <a:p>
+                      <a:pPr algn="ctr"/>
+                      <a:r>
+                        <a:rPr lang="en-US" dirty="0"/>
+                        <a:t>TATA Prediction</a:t>
+                      </a:r>
+                      <a:endParaRPr lang="en-ID" dirty="0"/>
+                    </a:p>
+                  </a:txBody>
+                  <a:tcPr/>
+                </a:tc>
+                <a:tc hMerge="1">
+                  <a:txBody>
+                    <a:bodyPr/>
+                    <a:lstStyle/>
+                    <a:p>
+                      <a:endParaRPr lang="en-ID" dirty="0"/>
+                    </a:p>
+                  </a:txBody>
+                  <a:tcPr/>
+                </a:tc>
+                <a:tc gridSpan="2">
+                  <a:txBody>
+                    <a:bodyPr/>
+                    <a:lstStyle/>
+                    <a:p>
+                      <a:pPr algn="ctr"/>
+                      <a:r>
+                        <a:rPr lang="en-US" dirty="0"/>
+                        <a:t>Non TATA Prediction</a:t>
+                      </a:r>
+                      <a:endParaRPr lang="en-ID" dirty="0"/>
+                    </a:p>
+                  </a:txBody>
+                  <a:tcPr/>
+                </a:tc>
+                <a:tc hMerge="1">
+                  <a:txBody>
+                    <a:bodyPr/>
+                    <a:lstStyle/>
+                    <a:p>
+                      <a:endParaRPr lang="en-ID" dirty="0"/>
+                    </a:p>
+                  </a:txBody>
+                  <a:tcPr/>
+                </a:tc>
+                <a:extLst>
+                  <a:ext uri="{0D108BD9-81ED-4DB2-BD59-A6C34878D82A}">
+                    <a16:rowId xmlns:a16="http://schemas.microsoft.com/office/drawing/2014/main" val="233693690"/>
+                  </a:ext>
+                </a:extLst>
+              </a:tr>
+              <a:tr h="370840">
+                <a:tc vMerge="1">
+                  <a:txBody>
+                    <a:bodyPr/>
+                    <a:lstStyle/>
+                    <a:p>
+                      <a:endParaRPr lang="en-ID" dirty="0"/>
+                    </a:p>
+                  </a:txBody>
+                  <a:tcPr/>
+                </a:tc>
+                <a:tc>
+                  <a:txBody>
+                    <a:bodyPr/>
+                    <a:lstStyle/>
+                    <a:p>
+                      <a:r>
+                        <a:rPr lang="en-US" dirty="0"/>
+                        <a:t>Correct</a:t>
+                      </a:r>
+                      <a:endParaRPr lang="en-ID" dirty="0"/>
+                    </a:p>
+                  </a:txBody>
+                  <a:tcPr/>
+                </a:tc>
+                <a:tc>
+                  <a:txBody>
+                    <a:bodyPr/>
+                    <a:lstStyle/>
+                    <a:p>
+                      <a:r>
+                        <a:rPr lang="en-US" dirty="0"/>
+                        <a:t>Miss</a:t>
+                      </a:r>
+                      <a:endParaRPr lang="en-ID" dirty="0"/>
+                    </a:p>
+                  </a:txBody>
+                  <a:tcPr/>
+                </a:tc>
+                <a:tc>
+                  <a:txBody>
+                    <a:bodyPr/>
+                    <a:lstStyle/>
+                    <a:p>
+                      <a:r>
+                        <a:rPr lang="en-US" dirty="0"/>
+                        <a:t>Correct</a:t>
+                      </a:r>
+                      <a:endParaRPr lang="en-ID" dirty="0"/>
+                    </a:p>
+                  </a:txBody>
+                  <a:tcPr/>
+                </a:tc>
+                <a:tc>
+                  <a:txBody>
+                    <a:bodyPr/>
+                    <a:lstStyle/>
+                    <a:p>
+                      <a:r>
+                        <a:rPr lang="en-US" dirty="0"/>
+                        <a:t>Miss</a:t>
+                      </a:r>
+                      <a:endParaRPr lang="en-ID" dirty="0"/>
+                    </a:p>
+                  </a:txBody>
+                  <a:tcPr/>
+                </a:tc>
+                <a:extLst>
+                  <a:ext uri="{0D108BD9-81ED-4DB2-BD59-A6C34878D82A}">
+                    <a16:rowId xmlns:a16="http://schemas.microsoft.com/office/drawing/2014/main" val="2026210214"/>
+                  </a:ext>
+                </a:extLst>
+              </a:tr>
+              <a:tr h="370840">
+                <a:tc>
+                  <a:txBody>
+                    <a:bodyPr/>
+                    <a:lstStyle/>
+                    <a:p>
+                      <a:r>
+                        <a:rPr lang="en-US" dirty="0" err="1"/>
+                        <a:t>macaca_tata_positive</a:t>
+                      </a:r>
+                      <a:endParaRPr lang="en-ID" dirty="0"/>
+                    </a:p>
+                  </a:txBody>
+                  <a:tcPr/>
+                </a:tc>
+                <a:tc>
+                  <a:txBody>
+                    <a:bodyPr/>
+                    <a:lstStyle/>
+                    <a:p>
+                      <a:r>
+                        <a:rPr lang="en-US" dirty="0"/>
+                        <a:t>134</a:t>
+                      </a:r>
+                      <a:endParaRPr lang="en-ID" dirty="0"/>
+                    </a:p>
+                  </a:txBody>
+                  <a:tcPr/>
+                </a:tc>
+                <a:tc>
+                  <a:txBody>
+                    <a:bodyPr/>
+                    <a:lstStyle/>
+                    <a:p>
+                      <a:r>
+                        <a:rPr lang="en-US" dirty="0"/>
+                        <a:t>166</a:t>
+                      </a:r>
+                      <a:endParaRPr lang="en-ID" dirty="0"/>
+                    </a:p>
+                  </a:txBody>
+                  <a:tcPr/>
+                </a:tc>
+                <a:tc>
+                  <a:txBody>
+                    <a:bodyPr/>
+                    <a:lstStyle/>
+                    <a:p>
+                      <a:r>
+                        <a:rPr lang="en-US" dirty="0"/>
+                        <a:t>59</a:t>
+                      </a:r>
+                      <a:endParaRPr lang="en-ID" dirty="0"/>
+                    </a:p>
+                  </a:txBody>
+                  <a:tcPr/>
+                </a:tc>
+                <a:tc>
+                  <a:txBody>
+                    <a:bodyPr/>
+                    <a:lstStyle/>
+                    <a:p>
+                      <a:r>
+                        <a:rPr lang="en-US" dirty="0"/>
+                        <a:t>241</a:t>
+                      </a:r>
+                      <a:endParaRPr lang="en-ID" dirty="0"/>
+                    </a:p>
+                  </a:txBody>
+                  <a:tcPr/>
+                </a:tc>
+                <a:extLst>
+                  <a:ext uri="{0D108BD9-81ED-4DB2-BD59-A6C34878D82A}">
+                    <a16:rowId xmlns:a16="http://schemas.microsoft.com/office/drawing/2014/main" val="2882772645"/>
+                  </a:ext>
+                </a:extLst>
+              </a:tr>
+              <a:tr h="370840">
+                <a:tc>
+                  <a:txBody>
+                    <a:bodyPr/>
+                    <a:lstStyle/>
+                    <a:p>
+                      <a:r>
+                        <a:rPr lang="en-US" dirty="0" err="1"/>
+                        <a:t>macaca_tata_negative</a:t>
+                      </a:r>
+                      <a:endParaRPr lang="en-ID" dirty="0"/>
+                    </a:p>
+                  </a:txBody>
+                  <a:tcPr/>
+                </a:tc>
+                <a:tc>
+                  <a:txBody>
+                    <a:bodyPr/>
+                    <a:lstStyle/>
+                    <a:p>
+                      <a:r>
+                        <a:rPr lang="en-US" dirty="0"/>
+                        <a:t>180</a:t>
+                      </a:r>
+                      <a:endParaRPr lang="en-ID" dirty="0"/>
+                    </a:p>
+                  </a:txBody>
+                  <a:tcPr/>
+                </a:tc>
+                <a:tc>
+                  <a:txBody>
+                    <a:bodyPr/>
+                    <a:lstStyle/>
+                    <a:p>
+                      <a:r>
+                        <a:rPr lang="en-US" dirty="0"/>
+                        <a:t>120</a:t>
+                      </a:r>
+                      <a:endParaRPr lang="en-ID" dirty="0"/>
+                    </a:p>
+                  </a:txBody>
+                  <a:tcPr/>
+                </a:tc>
+                <a:tc>
+                  <a:txBody>
+                    <a:bodyPr/>
+                    <a:lstStyle/>
+                    <a:p>
+                      <a:r>
+                        <a:rPr lang="en-US" dirty="0"/>
+                        <a:t>86</a:t>
+                      </a:r>
+                      <a:endParaRPr lang="en-ID" dirty="0"/>
+                    </a:p>
+                  </a:txBody>
+                  <a:tcPr/>
+                </a:tc>
+                <a:tc>
+                  <a:txBody>
+                    <a:bodyPr/>
+                    <a:lstStyle/>
+                    <a:p>
+                      <a:r>
+                        <a:rPr lang="en-US" dirty="0"/>
+                        <a:t>214</a:t>
+                      </a:r>
+                      <a:endParaRPr lang="en-ID" dirty="0"/>
+                    </a:p>
+                  </a:txBody>
+                  <a:tcPr/>
+                </a:tc>
+                <a:extLst>
+                  <a:ext uri="{0D108BD9-81ED-4DB2-BD59-A6C34878D82A}">
+                    <a16:rowId xmlns:a16="http://schemas.microsoft.com/office/drawing/2014/main" val="511538562"/>
+                  </a:ext>
+                </a:extLst>
+              </a:tr>
+            </a:tbl>
+          </a:graphicData>
+        </a:graphic>
+      </p:graphicFrame>
+      <p:graphicFrame>
+        <p:nvGraphicFramePr>
+          <p:cNvPr id="5" name="Table 5">
+            <a:extLst>
+              <a:ext uri="{FF2B5EF4-FFF2-40B4-BE49-F238E27FC236}">
+                <a16:creationId xmlns:a16="http://schemas.microsoft.com/office/drawing/2014/main" id="{25EFD278-A9A7-44C4-9433-CD50AC892A4F}"/>
+              </a:ext>
+            </a:extLst>
+          </p:cNvPr>
+          <p:cNvGraphicFramePr>
+            <a:graphicFrameLocks noGrp="1"/>
+          </p:cNvGraphicFramePr>
+          <p:nvPr>
+            <p:extLst>
+              <p:ext uri="{D42A27DB-BD31-4B8C-83A1-F6EECF244321}">
+                <p14:modId xmlns:p14="http://schemas.microsoft.com/office/powerpoint/2010/main" val="2196159613"/>
+              </p:ext>
+            </p:extLst>
+          </p:nvPr>
+        </p:nvGraphicFramePr>
+        <p:xfrm>
+          <a:off x="2031999" y="5182234"/>
+          <a:ext cx="8127999" cy="1112520"/>
+        </p:xfrm>
+        <a:graphic>
+          <a:graphicData uri="http://schemas.openxmlformats.org/drawingml/2006/table">
+            <a:tbl>
+              <a:tblPr firstRow="1" bandRow="1">
+                <a:tableStyleId>{5C22544A-7EE6-4342-B048-85BDC9FD1C3A}</a:tableStyleId>
+              </a:tblPr>
+              <a:tblGrid>
+                <a:gridCol w="2709333">
+                  <a:extLst>
+                    <a:ext uri="{9D8B030D-6E8A-4147-A177-3AD203B41FA5}">
+                      <a16:colId xmlns:a16="http://schemas.microsoft.com/office/drawing/2014/main" val="2583872247"/>
+                    </a:ext>
+                  </a:extLst>
+                </a:gridCol>
+                <a:gridCol w="2709333">
+                  <a:extLst>
+                    <a:ext uri="{9D8B030D-6E8A-4147-A177-3AD203B41FA5}">
+                      <a16:colId xmlns:a16="http://schemas.microsoft.com/office/drawing/2014/main" val="1584195857"/>
+                    </a:ext>
+                  </a:extLst>
+                </a:gridCol>
+                <a:gridCol w="2709333">
+                  <a:extLst>
+                    <a:ext uri="{9D8B030D-6E8A-4147-A177-3AD203B41FA5}">
+                      <a16:colId xmlns:a16="http://schemas.microsoft.com/office/drawing/2014/main" val="4284155090"/>
+                    </a:ext>
+                  </a:extLst>
+                </a:gridCol>
+              </a:tblGrid>
+              <a:tr h="370840">
+                <a:tc>
+                  <a:txBody>
+                    <a:bodyPr/>
+                    <a:lstStyle/>
+                    <a:p>
+                      <a:r>
+                        <a:rPr lang="en-US" dirty="0" err="1"/>
+                        <a:t>Akurasi</a:t>
+                      </a:r>
+                      <a:endParaRPr lang="en-ID" dirty="0"/>
+                    </a:p>
+                  </a:txBody>
+                  <a:tcPr/>
+                </a:tc>
+                <a:tc>
+                  <a:txBody>
+                    <a:bodyPr/>
+                    <a:lstStyle/>
+                    <a:p>
+                      <a:r>
+                        <a:rPr lang="en-US" dirty="0"/>
+                        <a:t>TATA Prediction</a:t>
+                      </a:r>
+                      <a:endParaRPr lang="en-ID" dirty="0"/>
+                    </a:p>
+                  </a:txBody>
+                  <a:tcPr/>
+                </a:tc>
+                <a:tc>
+                  <a:txBody>
+                    <a:bodyPr/>
+                    <a:lstStyle/>
+                    <a:p>
+                      <a:r>
+                        <a:rPr lang="en-US" dirty="0"/>
+                        <a:t>Non TATA Prediction</a:t>
+                      </a:r>
+                      <a:endParaRPr lang="en-ID" dirty="0"/>
+                    </a:p>
+                  </a:txBody>
+                  <a:tcPr/>
+                </a:tc>
+                <a:extLst>
+                  <a:ext uri="{0D108BD9-81ED-4DB2-BD59-A6C34878D82A}">
+                    <a16:rowId xmlns:a16="http://schemas.microsoft.com/office/drawing/2014/main" val="3178124183"/>
+                  </a:ext>
+                </a:extLst>
+              </a:tr>
+              <a:tr h="370840">
+                <a:tc>
+                  <a:txBody>
+                    <a:bodyPr/>
+                    <a:lstStyle/>
+                    <a:p>
+                      <a:r>
+                        <a:rPr lang="en-US" dirty="0" err="1"/>
+                        <a:t>macaca_tata_positive</a:t>
+                      </a:r>
+                      <a:endParaRPr lang="en-ID" dirty="0"/>
+                    </a:p>
+                  </a:txBody>
+                  <a:tcPr/>
+                </a:tc>
+                <a:tc>
+                  <a:txBody>
+                    <a:bodyPr/>
+                    <a:lstStyle/>
+                    <a:p>
+                      <a:r>
+                        <a:rPr lang="en-US" dirty="0"/>
+                        <a:t>44.67%</a:t>
+                      </a:r>
+                      <a:endParaRPr lang="en-ID" dirty="0"/>
+                    </a:p>
+                  </a:txBody>
+                  <a:tcPr/>
+                </a:tc>
+                <a:tc>
+                  <a:txBody>
+                    <a:bodyPr/>
+                    <a:lstStyle/>
+                    <a:p>
+                      <a:r>
+                        <a:rPr lang="en-US" dirty="0"/>
+                        <a:t>19.67%</a:t>
+                      </a:r>
+                      <a:endParaRPr lang="en-ID" dirty="0"/>
+                    </a:p>
+                  </a:txBody>
+                  <a:tcPr/>
+                </a:tc>
+                <a:extLst>
+                  <a:ext uri="{0D108BD9-81ED-4DB2-BD59-A6C34878D82A}">
+                    <a16:rowId xmlns:a16="http://schemas.microsoft.com/office/drawing/2014/main" val="3106745198"/>
+                  </a:ext>
+                </a:extLst>
+              </a:tr>
+              <a:tr h="370840">
+                <a:tc>
+                  <a:txBody>
+                    <a:bodyPr/>
+                    <a:lstStyle/>
+                    <a:p>
+                      <a:r>
+                        <a:rPr lang="en-US" dirty="0" err="1"/>
+                        <a:t>macaca_tata_negative</a:t>
+                      </a:r>
+                      <a:endParaRPr lang="en-ID" dirty="0"/>
+                    </a:p>
+                  </a:txBody>
+                  <a:tcPr/>
+                </a:tc>
+                <a:tc>
+                  <a:txBody>
+                    <a:bodyPr/>
+                    <a:lstStyle/>
+                    <a:p>
+                      <a:r>
+                        <a:rPr lang="en-US" dirty="0"/>
+                        <a:t>60%</a:t>
+                      </a:r>
+                      <a:endParaRPr lang="en-ID" dirty="0"/>
+                    </a:p>
+                  </a:txBody>
+                  <a:tcPr/>
+                </a:tc>
+                <a:tc>
+                  <a:txBody>
+                    <a:bodyPr/>
+                    <a:lstStyle/>
+                    <a:p>
+                      <a:r>
+                        <a:rPr lang="en-US" dirty="0"/>
+                        <a:t>28.67%</a:t>
+                      </a:r>
+                      <a:endParaRPr lang="en-ID" dirty="0"/>
+                    </a:p>
+                  </a:txBody>
+                  <a:tcPr/>
+                </a:tc>
+                <a:extLst>
+                  <a:ext uri="{0D108BD9-81ED-4DB2-BD59-A6C34878D82A}">
+                    <a16:rowId xmlns:a16="http://schemas.microsoft.com/office/drawing/2014/main" val="2267356706"/>
+                  </a:ext>
+                </a:extLst>
+              </a:tr>
+            </a:tbl>
+          </a:graphicData>
+        </a:graphic>
+      </p:graphicFrame>
+    </p:spTree>
+    <p:extLst>
+      <p:ext uri="{BB962C8B-B14F-4D97-AF65-F5344CB8AC3E}">
+        <p14:creationId xmlns:p14="http://schemas.microsoft.com/office/powerpoint/2010/main" val="3449776549"/>
+      </p:ext>
+    </p:extLst>
+  </p:cSld>
+  <p:clrMapOvr>
+    <a:masterClrMapping/>
+  </p:clrMapOvr>
+</p:sld>
+</file>
+
+<file path=ppt/slides/slide6.xml><?xml version="1.0" encoding="utf-8"?>
 <p:sld xmlns:a="http://schemas.openxmlformats.org/drawingml/2006/main" xmlns:r="http://schemas.openxmlformats.org/officeDocument/2006/relationships" xmlns:p="http://schemas.openxmlformats.org/presentationml/2006/main">
   <p:cSld>
     <p:spTree>
@@ -20439,7 +22749,7 @@
 </p:sld>
 </file>
 
-<file path=ppt/slides/slide5.xml><?xml version="1.0" encoding="utf-8"?>
+<file path=ppt/slides/slide7.xml><?xml version="1.0" encoding="utf-8"?>
 <p:sld xmlns:a="http://schemas.openxmlformats.org/drawingml/2006/main" xmlns:r="http://schemas.openxmlformats.org/officeDocument/2006/relationships" xmlns:p="http://schemas.openxmlformats.org/presentationml/2006/main">
   <p:cSld>
     <p:spTree>
@@ -20765,7 +23075,7 @@
 </p:sld>
 </file>
 
-<file path=ppt/slides/slide6.xml><?xml version="1.0" encoding="utf-8"?>
+<file path=ppt/slides/slide8.xml><?xml version="1.0" encoding="utf-8"?>
 <p:sld xmlns:a="http://schemas.openxmlformats.org/drawingml/2006/main" xmlns:r="http://schemas.openxmlformats.org/officeDocument/2006/relationships" xmlns:p="http://schemas.openxmlformats.org/presentationml/2006/main">
   <p:cSld>
     <p:spTree>
@@ -20941,7 +23251,7 @@
 </p:sld>
 </file>
 
-<file path=ppt/slides/slide7.xml><?xml version="1.0" encoding="utf-8"?>
+<file path=ppt/slides/slide9.xml><?xml version="1.0" encoding="utf-8"?>
 <p:sld xmlns:a="http://schemas.openxmlformats.org/drawingml/2006/main" xmlns:r="http://schemas.openxmlformats.org/officeDocument/2006/relationships" xmlns:p="http://schemas.openxmlformats.org/presentationml/2006/main">
   <p:cSld>
     <p:spTree>
@@ -21038,476 +23348,6 @@
     <p:extLst>
       <p:ext uri="{BB962C8B-B14F-4D97-AF65-F5344CB8AC3E}">
         <p14:creationId xmlns:p14="http://schemas.microsoft.com/office/powerpoint/2010/main" val="806437859"/>
-      </p:ext>
-    </p:extLst>
-  </p:cSld>
-  <p:clrMapOvr>
-    <a:masterClrMapping/>
-  </p:clrMapOvr>
-</p:sld>
-</file>
-
-<file path=ppt/slides/slide8.xml><?xml version="1.0" encoding="utf-8"?>
-<p:sld xmlns:a="http://schemas.openxmlformats.org/drawingml/2006/main" xmlns:r="http://schemas.openxmlformats.org/officeDocument/2006/relationships" xmlns:p="http://schemas.openxmlformats.org/presentationml/2006/main">
-  <p:cSld>
-    <p:spTree>
-      <p:nvGrpSpPr>
-        <p:cNvPr id="1" name=""/>
-        <p:cNvGrpSpPr/>
-        <p:nvPr/>
-      </p:nvGrpSpPr>
-      <p:grpSpPr>
-        <a:xfrm>
-          <a:off x="0" y="0"/>
-          <a:ext cx="0" cy="0"/>
-          <a:chOff x="0" y="0"/>
-          <a:chExt cx="0" cy="0"/>
-        </a:xfrm>
-      </p:grpSpPr>
-      <p:sp>
-        <p:nvSpPr>
-          <p:cNvPr id="2" name="Title 1">
-            <a:extLst>
-              <a:ext uri="{FF2B5EF4-FFF2-40B4-BE49-F238E27FC236}">
-                <a16:creationId xmlns:a16="http://schemas.microsoft.com/office/drawing/2014/main" id="{0FCEBAD1-D6BA-410C-8D4E-2A4246C18FF5}"/>
-              </a:ext>
-            </a:extLst>
-          </p:cNvPr>
-          <p:cNvSpPr>
-            <a:spLocks noGrp="1"/>
-          </p:cNvSpPr>
-          <p:nvPr>
-            <p:ph type="title"/>
-          </p:nvPr>
-        </p:nvSpPr>
-        <p:spPr/>
-        <p:txBody>
-          <a:bodyPr/>
-          <a:lstStyle/>
-          <a:p>
-            <a:r>
-              <a:rPr lang="en-US" dirty="0"/>
-              <a:t>Promoter Detection</a:t>
-            </a:r>
-            <a:endParaRPr lang="en-ID" dirty="0"/>
-          </a:p>
-        </p:txBody>
-      </p:sp>
-      <p:sp>
-        <p:nvSpPr>
-          <p:cNvPr id="3" name="Content Placeholder 2">
-            <a:extLst>
-              <a:ext uri="{FF2B5EF4-FFF2-40B4-BE49-F238E27FC236}">
-                <a16:creationId xmlns:a16="http://schemas.microsoft.com/office/drawing/2014/main" id="{BA715C03-2461-4530-BCC0-D070505651A5}"/>
-              </a:ext>
-            </a:extLst>
-          </p:cNvPr>
-          <p:cNvSpPr>
-            <a:spLocks noGrp="1"/>
-          </p:cNvSpPr>
-          <p:nvPr>
-            <p:ph idx="1"/>
-          </p:nvPr>
-        </p:nvSpPr>
-        <p:spPr/>
-        <p:txBody>
-          <a:bodyPr/>
-          <a:lstStyle/>
-          <a:p>
-            <a:r>
-              <a:rPr lang="en-US" dirty="0"/>
-              <a:t>TATA-box </a:t>
-            </a:r>
-            <a:r>
-              <a:rPr lang="en-US" dirty="0" err="1"/>
-              <a:t>adalah</a:t>
-            </a:r>
-            <a:r>
-              <a:rPr lang="en-US" dirty="0"/>
-              <a:t> promotor yang </a:t>
-            </a:r>
-            <a:r>
-              <a:rPr lang="en-US" dirty="0" err="1"/>
-              <a:t>terdiri</a:t>
-            </a:r>
-            <a:r>
-              <a:rPr lang="en-US" dirty="0"/>
-              <a:t> </a:t>
-            </a:r>
-            <a:r>
-              <a:rPr lang="en-US" dirty="0" err="1"/>
-              <a:t>dari</a:t>
-            </a:r>
-            <a:r>
-              <a:rPr lang="en-US" dirty="0"/>
-              <a:t> T dan A yang </a:t>
-            </a:r>
-            <a:r>
-              <a:rPr lang="en-US" dirty="0" err="1"/>
-              <a:t>berulang</a:t>
-            </a:r>
-            <a:r>
-              <a:rPr lang="en-US" dirty="0"/>
-              <a:t> (TATAAA)</a:t>
-            </a:r>
-          </a:p>
-          <a:p>
-            <a:pPr lvl="1"/>
-            <a:r>
-              <a:rPr lang="en-US" dirty="0"/>
-              <a:t>Problem : Belum </a:t>
-            </a:r>
-            <a:r>
-              <a:rPr lang="en-US" dirty="0" err="1"/>
-              <a:t>tentu</a:t>
-            </a:r>
-            <a:r>
-              <a:rPr lang="en-US" dirty="0"/>
-              <a:t> </a:t>
-            </a:r>
-            <a:r>
-              <a:rPr lang="en-US" dirty="0" err="1"/>
-              <a:t>tiap</a:t>
-            </a:r>
-            <a:r>
-              <a:rPr lang="en-US" dirty="0"/>
-              <a:t> </a:t>
-            </a:r>
-            <a:r>
-              <a:rPr lang="en-US" dirty="0" err="1"/>
-              <a:t>sekuens</a:t>
-            </a:r>
-            <a:r>
-              <a:rPr lang="en-US" dirty="0"/>
-              <a:t> </a:t>
-            </a:r>
-            <a:r>
-              <a:rPr lang="en-US" b="1" dirty="0"/>
-              <a:t>TATAAA</a:t>
-            </a:r>
-            <a:r>
-              <a:rPr lang="en-US" dirty="0"/>
-              <a:t> </a:t>
-            </a:r>
-            <a:r>
-              <a:rPr lang="en-US" dirty="0" err="1"/>
-              <a:t>adalah</a:t>
-            </a:r>
-            <a:r>
-              <a:rPr lang="en-US" dirty="0"/>
-              <a:t> promoter</a:t>
-            </a:r>
-            <a:endParaRPr lang="en-ID" dirty="0"/>
-          </a:p>
-          <a:p>
-            <a:r>
-              <a:rPr lang="en-ID" dirty="0"/>
-              <a:t>Hal yang </a:t>
-            </a:r>
-            <a:r>
-              <a:rPr lang="en-ID" dirty="0" err="1"/>
-              <a:t>sama</a:t>
-            </a:r>
-            <a:r>
-              <a:rPr lang="en-ID" dirty="0"/>
-              <a:t> </a:t>
-            </a:r>
-            <a:r>
-              <a:rPr lang="en-ID" dirty="0" err="1"/>
-              <a:t>berlaku</a:t>
-            </a:r>
-            <a:r>
-              <a:rPr lang="en-ID" dirty="0"/>
-              <a:t> pada promoter CAAT-Box dan GC-Box</a:t>
-            </a:r>
-          </a:p>
-          <a:p>
-            <a:pPr lvl="1"/>
-            <a:r>
-              <a:rPr lang="en-ID" dirty="0"/>
-              <a:t>CAAT-Box </a:t>
-            </a:r>
-            <a:r>
-              <a:rPr lang="en-ID" dirty="0" err="1"/>
-              <a:t>atau</a:t>
-            </a:r>
-            <a:r>
-              <a:rPr lang="en-ID" dirty="0"/>
-              <a:t> CCAAT-Box </a:t>
-            </a:r>
-            <a:r>
-              <a:rPr lang="en-ID" dirty="0" err="1"/>
-              <a:t>adalah</a:t>
-            </a:r>
-            <a:r>
-              <a:rPr lang="en-ID" dirty="0"/>
-              <a:t> promoter </a:t>
-            </a:r>
-            <a:r>
-              <a:rPr lang="en-ID" dirty="0" err="1"/>
-              <a:t>dengan</a:t>
-            </a:r>
-            <a:r>
-              <a:rPr lang="en-ID" dirty="0"/>
-              <a:t> </a:t>
-            </a:r>
-            <a:r>
-              <a:rPr lang="en-ID" dirty="0" err="1"/>
-              <a:t>sekuens</a:t>
-            </a:r>
-            <a:r>
-              <a:rPr lang="en-ID" dirty="0"/>
-              <a:t> </a:t>
-            </a:r>
-            <a:r>
-              <a:rPr lang="en-ID" b="1" dirty="0"/>
-              <a:t>GGCCAATCT</a:t>
-            </a:r>
-            <a:r>
-              <a:rPr lang="en-ID" dirty="0"/>
-              <a:t>.</a:t>
-            </a:r>
-          </a:p>
-          <a:p>
-            <a:pPr lvl="1"/>
-            <a:r>
-              <a:rPr lang="en-ID" dirty="0"/>
-              <a:t>GC-Box </a:t>
-            </a:r>
-            <a:r>
-              <a:rPr lang="en-ID" dirty="0" err="1"/>
-              <a:t>adalah</a:t>
-            </a:r>
-            <a:r>
-              <a:rPr lang="en-ID" dirty="0"/>
-              <a:t> promoter </a:t>
-            </a:r>
-            <a:r>
-              <a:rPr lang="en-ID" dirty="0" err="1"/>
-              <a:t>dengan</a:t>
-            </a:r>
-            <a:r>
-              <a:rPr lang="en-ID" dirty="0"/>
-              <a:t> </a:t>
-            </a:r>
-            <a:r>
-              <a:rPr lang="en-ID" dirty="0" err="1"/>
-              <a:t>sekuens</a:t>
-            </a:r>
-            <a:r>
-              <a:rPr lang="en-ID" dirty="0"/>
-              <a:t> </a:t>
-            </a:r>
-            <a:r>
-              <a:rPr lang="en-ID" b="1" dirty="0"/>
-              <a:t>GGGCGG</a:t>
-            </a:r>
-            <a:r>
-              <a:rPr lang="en-ID" dirty="0"/>
-              <a:t>.</a:t>
-            </a:r>
-          </a:p>
-          <a:p>
-            <a:r>
-              <a:rPr lang="en-ID" dirty="0"/>
-              <a:t>Pada “</a:t>
-            </a:r>
-            <a:r>
-              <a:rPr lang="en-ID" dirty="0" err="1"/>
-              <a:t>konteks</a:t>
-            </a:r>
-            <a:r>
-              <a:rPr lang="en-ID" dirty="0"/>
-              <a:t>” </a:t>
-            </a:r>
-            <a:r>
-              <a:rPr lang="en-ID" dirty="0" err="1"/>
-              <a:t>tertentu</a:t>
-            </a:r>
-            <a:r>
-              <a:rPr lang="en-ID" dirty="0"/>
-              <a:t> TATA-box, CAAT-Box, dan GC-Box </a:t>
-            </a:r>
-            <a:r>
-              <a:rPr lang="en-ID" dirty="0" err="1"/>
-              <a:t>adalah</a:t>
-            </a:r>
-            <a:r>
-              <a:rPr lang="en-ID" dirty="0"/>
-              <a:t> promoter. Pada </a:t>
-            </a:r>
-            <a:r>
-              <a:rPr lang="en-ID" dirty="0" err="1"/>
-              <a:t>konteks</a:t>
-            </a:r>
-            <a:r>
-              <a:rPr lang="en-ID" dirty="0"/>
-              <a:t> yang lain </a:t>
-            </a:r>
-            <a:r>
-              <a:rPr lang="en-ID" dirty="0" err="1"/>
-              <a:t>boleh</a:t>
-            </a:r>
-            <a:r>
-              <a:rPr lang="en-ID" dirty="0"/>
-              <a:t> </a:t>
-            </a:r>
-            <a:r>
-              <a:rPr lang="en-ID" dirty="0" err="1"/>
-              <a:t>jadi</a:t>
-            </a:r>
-            <a:r>
-              <a:rPr lang="en-ID" dirty="0"/>
-              <a:t> </a:t>
-            </a:r>
-            <a:r>
-              <a:rPr lang="en-ID" dirty="0" err="1"/>
-              <a:t>sekuens</a:t>
-            </a:r>
-            <a:r>
-              <a:rPr lang="en-ID" dirty="0"/>
-              <a:t> </a:t>
-            </a:r>
-            <a:r>
-              <a:rPr lang="en-ID" dirty="0" err="1"/>
-              <a:t>ini</a:t>
-            </a:r>
-            <a:r>
-              <a:rPr lang="en-ID" dirty="0"/>
-              <a:t> </a:t>
-            </a:r>
-            <a:r>
-              <a:rPr lang="en-ID" dirty="0" err="1"/>
-              <a:t>bermakna</a:t>
-            </a:r>
-            <a:r>
-              <a:rPr lang="en-ID" dirty="0"/>
-              <a:t> lain, mis. </a:t>
-            </a:r>
-            <a:r>
-              <a:rPr lang="en-ID" dirty="0" err="1"/>
-              <a:t>asam</a:t>
-            </a:r>
-            <a:r>
-              <a:rPr lang="en-ID" dirty="0"/>
-              <a:t> amino.</a:t>
-            </a:r>
-          </a:p>
-          <a:p>
-            <a:endParaRPr lang="en-US" dirty="0"/>
-          </a:p>
-        </p:txBody>
-      </p:sp>
-    </p:spTree>
-    <p:extLst>
-      <p:ext uri="{BB962C8B-B14F-4D97-AF65-F5344CB8AC3E}">
-        <p14:creationId xmlns:p14="http://schemas.microsoft.com/office/powerpoint/2010/main" val="393952906"/>
-      </p:ext>
-    </p:extLst>
-  </p:cSld>
-  <p:clrMapOvr>
-    <a:masterClrMapping/>
-  </p:clrMapOvr>
-</p:sld>
-</file>
-
-<file path=ppt/slides/slide9.xml><?xml version="1.0" encoding="utf-8"?>
-<p:sld xmlns:a="http://schemas.openxmlformats.org/drawingml/2006/main" xmlns:r="http://schemas.openxmlformats.org/officeDocument/2006/relationships" xmlns:p="http://schemas.openxmlformats.org/presentationml/2006/main">
-  <p:cSld>
-    <p:spTree>
-      <p:nvGrpSpPr>
-        <p:cNvPr id="1" name=""/>
-        <p:cNvGrpSpPr/>
-        <p:nvPr/>
-      </p:nvGrpSpPr>
-      <p:grpSpPr>
-        <a:xfrm>
-          <a:off x="0" y="0"/>
-          <a:ext cx="0" cy="0"/>
-          <a:chOff x="0" y="0"/>
-          <a:chExt cx="0" cy="0"/>
-        </a:xfrm>
-      </p:grpSpPr>
-      <p:sp>
-        <p:nvSpPr>
-          <p:cNvPr id="2" name="Title 1">
-            <a:extLst>
-              <a:ext uri="{FF2B5EF4-FFF2-40B4-BE49-F238E27FC236}">
-                <a16:creationId xmlns:a16="http://schemas.microsoft.com/office/drawing/2014/main" id="{667CA607-5394-447F-8DA5-3895D5ED35CE}"/>
-              </a:ext>
-            </a:extLst>
-          </p:cNvPr>
-          <p:cNvSpPr>
-            <a:spLocks noGrp="1"/>
-          </p:cNvSpPr>
-          <p:nvPr>
-            <p:ph type="title"/>
-          </p:nvPr>
-        </p:nvSpPr>
-        <p:spPr/>
-        <p:txBody>
-          <a:bodyPr/>
-          <a:lstStyle/>
-          <a:p>
-            <a:r>
-              <a:rPr lang="en-US" dirty="0" err="1"/>
-              <a:t>Prediksi</a:t>
-            </a:r>
-            <a:r>
-              <a:rPr lang="en-US" dirty="0"/>
-              <a:t> TATA Promoter </a:t>
-            </a:r>
-            <a:r>
-              <a:rPr lang="en-US" dirty="0" err="1"/>
-              <a:t>dari</a:t>
-            </a:r>
-            <a:r>
-              <a:rPr lang="en-US" dirty="0"/>
-              <a:t> DNA </a:t>
-            </a:r>
-            <a:r>
-              <a:rPr lang="en-US" dirty="0" err="1"/>
-              <a:t>Manusia</a:t>
-            </a:r>
-            <a:endParaRPr lang="en-ID" dirty="0"/>
-          </a:p>
-        </p:txBody>
-      </p:sp>
-      <p:graphicFrame>
-        <p:nvGraphicFramePr>
-          <p:cNvPr id="4" name="Content Placeholder 3">
-            <a:extLst>
-              <a:ext uri="{FF2B5EF4-FFF2-40B4-BE49-F238E27FC236}">
-                <a16:creationId xmlns:a16="http://schemas.microsoft.com/office/drawing/2014/main" id="{F37CF49E-5604-4919-87C6-040791FF9490}"/>
-              </a:ext>
-            </a:extLst>
-          </p:cNvPr>
-          <p:cNvGraphicFramePr>
-            <a:graphicFrameLocks noGrp="1"/>
-          </p:cNvGraphicFramePr>
-          <p:nvPr>
-            <p:ph idx="1"/>
-            <p:extLst>
-              <p:ext uri="{D42A27DB-BD31-4B8C-83A1-F6EECF244321}">
-                <p14:modId xmlns:p14="http://schemas.microsoft.com/office/powerpoint/2010/main" val="3990138410"/>
-              </p:ext>
-            </p:extLst>
-          </p:nvPr>
-        </p:nvGraphicFramePr>
-        <p:xfrm>
-          <a:off x="838200" y="1825625"/>
-          <a:ext cx="10515600" cy="4351338"/>
-        </p:xfrm>
-        <a:graphic>
-          <a:graphicData uri="http://schemas.openxmlformats.org/drawingml/2006/chart">
-            <c:chart xmlns:c="http://schemas.openxmlformats.org/drawingml/2006/chart" xmlns:r="http://schemas.openxmlformats.org/officeDocument/2006/relationships" r:id="rId2"/>
-          </a:graphicData>
-        </a:graphic>
-      </p:graphicFrame>
-    </p:spTree>
-    <p:extLst>
-      <p:ext uri="{BB962C8B-B14F-4D97-AF65-F5344CB8AC3E}">
-        <p14:creationId xmlns:p14="http://schemas.microsoft.com/office/powerpoint/2010/main" val="1435027007"/>
       </p:ext>
     </p:extLst>
   </p:cSld>

</xml_diff>